<commit_message>
chaning conditional probabilities of mu and tau in MCMC
</commit_message>
<xml_diff>
--- a/results/summary_of_results.pptx
+++ b/results/summary_of_results.pptx
@@ -8,20 +8,21 @@
     <p:sldId id="256" r:id="rId2"/>
     <p:sldId id="281" r:id="rId3"/>
     <p:sldId id="282" r:id="rId4"/>
-    <p:sldId id="272" r:id="rId5"/>
-    <p:sldId id="274" r:id="rId6"/>
-    <p:sldId id="280" r:id="rId7"/>
-    <p:sldId id="278" r:id="rId8"/>
-    <p:sldId id="284" r:id="rId9"/>
-    <p:sldId id="292" r:id="rId10"/>
-    <p:sldId id="283" r:id="rId11"/>
-    <p:sldId id="285" r:id="rId12"/>
-    <p:sldId id="288" r:id="rId13"/>
-    <p:sldId id="286" r:id="rId14"/>
-    <p:sldId id="289" r:id="rId15"/>
-    <p:sldId id="287" r:id="rId16"/>
-    <p:sldId id="290" r:id="rId17"/>
-    <p:sldId id="291" r:id="rId18"/>
+    <p:sldId id="293" r:id="rId5"/>
+    <p:sldId id="272" r:id="rId6"/>
+    <p:sldId id="274" r:id="rId7"/>
+    <p:sldId id="280" r:id="rId8"/>
+    <p:sldId id="278" r:id="rId9"/>
+    <p:sldId id="284" r:id="rId10"/>
+    <p:sldId id="292" r:id="rId11"/>
+    <p:sldId id="283" r:id="rId12"/>
+    <p:sldId id="285" r:id="rId13"/>
+    <p:sldId id="288" r:id="rId14"/>
+    <p:sldId id="286" r:id="rId15"/>
+    <p:sldId id="289" r:id="rId16"/>
+    <p:sldId id="287" r:id="rId17"/>
+    <p:sldId id="290" r:id="rId18"/>
+    <p:sldId id="291" r:id="rId19"/>
   </p:sldIdLst>
   <p:sldSz cx="12192000" cy="6858000"/>
   <p:notesSz cx="6858000" cy="9144000"/>
@@ -286,7 +287,7 @@
           <a:p>
             <a:fld id="{70AAABBC-BF42-AD4B-8E11-BDCC99D86346}" type="datetimeFigureOut">
               <a:rPr lang="en-US" smtClean="0"/>
-              <a:t>10/3/23</a:t>
+              <a:t>11/7/23</a:t>
             </a:fld>
             <a:endParaRPr lang="en-US"/>
           </a:p>
@@ -484,7 +485,7 @@
           <a:p>
             <a:fld id="{70AAABBC-BF42-AD4B-8E11-BDCC99D86346}" type="datetimeFigureOut">
               <a:rPr lang="en-US" smtClean="0"/>
-              <a:t>10/3/23</a:t>
+              <a:t>11/7/23</a:t>
             </a:fld>
             <a:endParaRPr lang="en-US"/>
           </a:p>
@@ -692,7 +693,7 @@
           <a:p>
             <a:fld id="{70AAABBC-BF42-AD4B-8E11-BDCC99D86346}" type="datetimeFigureOut">
               <a:rPr lang="en-US" smtClean="0"/>
-              <a:t>10/3/23</a:t>
+              <a:t>11/7/23</a:t>
             </a:fld>
             <a:endParaRPr lang="en-US"/>
           </a:p>
@@ -890,7 +891,7 @@
           <a:p>
             <a:fld id="{70AAABBC-BF42-AD4B-8E11-BDCC99D86346}" type="datetimeFigureOut">
               <a:rPr lang="en-US" smtClean="0"/>
-              <a:t>10/3/23</a:t>
+              <a:t>11/7/23</a:t>
             </a:fld>
             <a:endParaRPr lang="en-US"/>
           </a:p>
@@ -1165,7 +1166,7 @@
           <a:p>
             <a:fld id="{70AAABBC-BF42-AD4B-8E11-BDCC99D86346}" type="datetimeFigureOut">
               <a:rPr lang="en-US" smtClean="0"/>
-              <a:t>10/3/23</a:t>
+              <a:t>11/7/23</a:t>
             </a:fld>
             <a:endParaRPr lang="en-US"/>
           </a:p>
@@ -1430,7 +1431,7 @@
           <a:p>
             <a:fld id="{70AAABBC-BF42-AD4B-8E11-BDCC99D86346}" type="datetimeFigureOut">
               <a:rPr lang="en-US" smtClean="0"/>
-              <a:t>10/3/23</a:t>
+              <a:t>11/7/23</a:t>
             </a:fld>
             <a:endParaRPr lang="en-US"/>
           </a:p>
@@ -1842,7 +1843,7 @@
           <a:p>
             <a:fld id="{70AAABBC-BF42-AD4B-8E11-BDCC99D86346}" type="datetimeFigureOut">
               <a:rPr lang="en-US" smtClean="0"/>
-              <a:t>10/3/23</a:t>
+              <a:t>11/7/23</a:t>
             </a:fld>
             <a:endParaRPr lang="en-US"/>
           </a:p>
@@ -1983,7 +1984,7 @@
           <a:p>
             <a:fld id="{70AAABBC-BF42-AD4B-8E11-BDCC99D86346}" type="datetimeFigureOut">
               <a:rPr lang="en-US" smtClean="0"/>
-              <a:t>10/3/23</a:t>
+              <a:t>11/7/23</a:t>
             </a:fld>
             <a:endParaRPr lang="en-US"/>
           </a:p>
@@ -2096,7 +2097,7 @@
           <a:p>
             <a:fld id="{70AAABBC-BF42-AD4B-8E11-BDCC99D86346}" type="datetimeFigureOut">
               <a:rPr lang="en-US" smtClean="0"/>
-              <a:t>10/3/23</a:t>
+              <a:t>11/7/23</a:t>
             </a:fld>
             <a:endParaRPr lang="en-US"/>
           </a:p>
@@ -2407,7 +2408,7 @@
           <a:p>
             <a:fld id="{70AAABBC-BF42-AD4B-8E11-BDCC99D86346}" type="datetimeFigureOut">
               <a:rPr lang="en-US" smtClean="0"/>
-              <a:t>10/3/23</a:t>
+              <a:t>11/7/23</a:t>
             </a:fld>
             <a:endParaRPr lang="en-US"/>
           </a:p>
@@ -2695,7 +2696,7 @@
           <a:p>
             <a:fld id="{70AAABBC-BF42-AD4B-8E11-BDCC99D86346}" type="datetimeFigureOut">
               <a:rPr lang="en-US" smtClean="0"/>
-              <a:t>10/3/23</a:t>
+              <a:t>11/7/23</a:t>
             </a:fld>
             <a:endParaRPr lang="en-US"/>
           </a:p>
@@ -2936,7 +2937,7 @@
           <a:p>
             <a:fld id="{70AAABBC-BF42-AD4B-8E11-BDCC99D86346}" type="datetimeFigureOut">
               <a:rPr lang="en-US" smtClean="0"/>
-              <a:t>10/3/23</a:t>
+              <a:t>11/7/23</a:t>
             </a:fld>
             <a:endParaRPr lang="en-US"/>
           </a:p>
@@ -3438,6 +3439,194 @@
       </p:grpSpPr>
       <p:sp>
         <p:nvSpPr>
+          <p:cNvPr id="4" name="Title 3">
+            <a:extLst>
+              <a:ext uri="{FF2B5EF4-FFF2-40B4-BE49-F238E27FC236}">
+                <a16:creationId xmlns:a16="http://schemas.microsoft.com/office/drawing/2014/main" id="{34BAE915-F5C6-7F3E-070D-5F8F00CBDF3B}"/>
+              </a:ext>
+            </a:extLst>
+          </p:cNvPr>
+          <p:cNvSpPr>
+            <a:spLocks noGrp="1"/>
+          </p:cNvSpPr>
+          <p:nvPr>
+            <p:ph type="title"/>
+          </p:nvPr>
+        </p:nvSpPr>
+        <p:spPr>
+          <a:xfrm>
+            <a:off x="274320" y="0"/>
+            <a:ext cx="10515600" cy="1325563"/>
+          </a:xfrm>
+        </p:spPr>
+        <p:txBody>
+          <a:bodyPr/>
+          <a:lstStyle/>
+          <a:p>
+            <a:r>
+              <a:rPr lang="en-US" dirty="0"/>
+              <a:t>Brief overview of inference pipeline</a:t>
+            </a:r>
+          </a:p>
+        </p:txBody>
+      </p:sp>
+      <p:sp>
+        <p:nvSpPr>
+          <p:cNvPr id="5" name="Content Placeholder 4">
+            <a:extLst>
+              <a:ext uri="{FF2B5EF4-FFF2-40B4-BE49-F238E27FC236}">
+                <a16:creationId xmlns:a16="http://schemas.microsoft.com/office/drawing/2014/main" id="{7B181E1F-6D54-55B9-3856-A2F4973E0985}"/>
+              </a:ext>
+            </a:extLst>
+          </p:cNvPr>
+          <p:cNvSpPr>
+            <a:spLocks noGrp="1"/>
+          </p:cNvSpPr>
+          <p:nvPr>
+            <p:ph idx="1"/>
+          </p:nvPr>
+        </p:nvSpPr>
+        <p:spPr>
+          <a:xfrm>
+            <a:off x="283845" y="1097280"/>
+            <a:ext cx="11624310" cy="5646419"/>
+          </a:xfrm>
+        </p:spPr>
+        <p:txBody>
+          <a:bodyPr>
+            <a:normAutofit/>
+          </a:bodyPr>
+          <a:lstStyle/>
+          <a:p>
+            <a:pPr marL="514350" indent="-514350">
+              <a:buFont typeface="+mj-lt"/>
+              <a:buAutoNum type="arabicPeriod"/>
+            </a:pPr>
+            <a:r>
+              <a:rPr lang="en-US" dirty="0"/>
+              <a:t>Use MCMC to infer the number of episomes per observed cluster in both non-dividing and dividing cells</a:t>
+            </a:r>
+          </a:p>
+          <a:p>
+            <a:pPr marL="971550" lvl="1" indent="-514350">
+              <a:buFont typeface="+mj-lt"/>
+              <a:buAutoNum type="alphaLcParenR"/>
+            </a:pPr>
+            <a:r>
+              <a:rPr lang="en-US" dirty="0"/>
+              <a:t>100,000 iterations</a:t>
+            </a:r>
+          </a:p>
+          <a:p>
+            <a:pPr marL="971550" lvl="1" indent="-514350">
+              <a:buFont typeface="+mj-lt"/>
+              <a:buAutoNum type="alphaLcParenR"/>
+            </a:pPr>
+            <a:r>
+              <a:rPr lang="en-US" dirty="0"/>
+              <a:t>5000 burn-in iterations</a:t>
+            </a:r>
+          </a:p>
+          <a:p>
+            <a:pPr marL="971550" lvl="1" indent="-514350">
+              <a:buFont typeface="+mj-lt"/>
+              <a:buAutoNum type="alphaLcParenR"/>
+            </a:pPr>
+            <a:r>
+              <a:rPr lang="en-US" dirty="0"/>
+              <a:t>Run two chains with different initial conditions to check convergence via </a:t>
+            </a:r>
+            <a:r>
+              <a:rPr lang="en-US" dirty="0" err="1"/>
+              <a:t>Rhat</a:t>
+            </a:r>
+            <a:r>
+              <a:rPr lang="en-US" dirty="0"/>
+              <a:t> and effective sample size</a:t>
+            </a:r>
+          </a:p>
+          <a:p>
+            <a:pPr marL="514350" indent="-514350">
+              <a:buFont typeface="+mj-lt"/>
+              <a:buAutoNum type="arabicPeriod"/>
+            </a:pPr>
+            <a:r>
+              <a:rPr lang="en-US" dirty="0"/>
+              <a:t>Add the samples of episomes per clusters within each cell at each iteration to construct a posterior distribution for the number of episomes per cell</a:t>
+            </a:r>
+          </a:p>
+          <a:p>
+            <a:pPr marL="514350" indent="-514350">
+              <a:buFont typeface="+mj-lt"/>
+              <a:buAutoNum type="arabicPeriod"/>
+            </a:pPr>
+            <a:r>
+              <a:rPr lang="en-US" dirty="0"/>
+              <a:t>Fit a </a:t>
+            </a:r>
+            <a:r>
+              <a:rPr lang="en-US" dirty="0" err="1"/>
+              <a:t>poisson</a:t>
+            </a:r>
+            <a:r>
+              <a:rPr lang="en-US" dirty="0"/>
+              <a:t> distribution to the number of episomes in non-dividing cells to get a probability distribution for X0</a:t>
+            </a:r>
+          </a:p>
+          <a:p>
+            <a:pPr marL="514350" indent="-514350">
+              <a:buFont typeface="+mj-lt"/>
+              <a:buAutoNum type="arabicPeriod"/>
+            </a:pPr>
+            <a:r>
+              <a:rPr lang="en-US" dirty="0"/>
+              <a:t>Run grid search for MLE of replication and segregation efficiency using likelihood function marginalized over X0</a:t>
+            </a:r>
+          </a:p>
+          <a:p>
+            <a:pPr marL="514350" indent="-514350">
+              <a:buFont typeface="+mj-lt"/>
+              <a:buAutoNum type="arabicPeriod"/>
+            </a:pPr>
+            <a:r>
+              <a:rPr lang="en-US" dirty="0"/>
+              <a:t>Find region of parameter values that make up 95% confidence region</a:t>
+            </a:r>
+          </a:p>
+        </p:txBody>
+      </p:sp>
+    </p:spTree>
+    <p:extLst>
+      <p:ext uri="{BB962C8B-B14F-4D97-AF65-F5344CB8AC3E}">
+        <p14:creationId xmlns:p14="http://schemas.microsoft.com/office/powerpoint/2010/main" val="1287202952"/>
+      </p:ext>
+    </p:extLst>
+  </p:cSld>
+  <p:clrMapOvr>
+    <a:masterClrMapping/>
+  </p:clrMapOvr>
+</p:sld>
+</file>
+
+<file path=ppt/slides/slide11.xml><?xml version="1.0" encoding="utf-8"?>
+<p:sld xmlns:a="http://schemas.openxmlformats.org/drawingml/2006/main" xmlns:r="http://schemas.openxmlformats.org/officeDocument/2006/relationships" xmlns:p="http://schemas.openxmlformats.org/presentationml/2006/main">
+  <p:cSld>
+    <p:spTree>
+      <p:nvGrpSpPr>
+        <p:cNvPr id="1" name=""/>
+        <p:cNvGrpSpPr/>
+        <p:nvPr/>
+      </p:nvGrpSpPr>
+      <p:grpSpPr>
+        <a:xfrm>
+          <a:off x="0" y="0"/>
+          <a:ext cx="0" cy="0"/>
+          <a:chOff x="0" y="0"/>
+          <a:chExt cx="0" cy="0"/>
+        </a:xfrm>
+      </p:grpSpPr>
+      <p:sp>
+        <p:nvSpPr>
           <p:cNvPr id="2" name="Title 1">
             <a:extLst>
               <a:ext uri="{FF2B5EF4-FFF2-40B4-BE49-F238E27FC236}">
@@ -3519,7 +3708,7 @@
 </p:sld>
 </file>
 
-<file path=ppt/slides/slide11.xml><?xml version="1.0" encoding="utf-8"?>
+<file path=ppt/slides/slide12.xml><?xml version="1.0" encoding="utf-8"?>
 <p:sld xmlns:a="http://schemas.openxmlformats.org/drawingml/2006/main" xmlns:r="http://schemas.openxmlformats.org/officeDocument/2006/relationships" xmlns:p="http://schemas.openxmlformats.org/presentationml/2006/main">
   <p:cSld>
     <p:spTree>
@@ -3658,7 +3847,7 @@
 </p:sld>
 </file>
 
-<file path=ppt/slides/slide12.xml><?xml version="1.0" encoding="utf-8"?>
+<file path=ppt/slides/slide13.xml><?xml version="1.0" encoding="utf-8"?>
 <p:sld xmlns:a="http://schemas.openxmlformats.org/drawingml/2006/main" xmlns:r="http://schemas.openxmlformats.org/officeDocument/2006/relationships" xmlns:p="http://schemas.openxmlformats.org/presentationml/2006/main">
   <p:cSld>
     <p:spTree>
@@ -3807,7 +3996,7 @@
 </p:sld>
 </file>
 
-<file path=ppt/slides/slide13.xml><?xml version="1.0" encoding="utf-8"?>
+<file path=ppt/slides/slide14.xml><?xml version="1.0" encoding="utf-8"?>
 <p:sld xmlns:a="http://schemas.openxmlformats.org/drawingml/2006/main" xmlns:r="http://schemas.openxmlformats.org/officeDocument/2006/relationships" xmlns:p="http://schemas.openxmlformats.org/presentationml/2006/main">
   <p:cSld>
     <p:spTree>
@@ -3941,7 +4130,7 @@
 </p:sld>
 </file>
 
-<file path=ppt/slides/slide14.xml><?xml version="1.0" encoding="utf-8"?>
+<file path=ppt/slides/slide15.xml><?xml version="1.0" encoding="utf-8"?>
 <p:sld xmlns:a="http://schemas.openxmlformats.org/drawingml/2006/main" xmlns:r="http://schemas.openxmlformats.org/officeDocument/2006/relationships" xmlns:p="http://schemas.openxmlformats.org/presentationml/2006/main">
   <p:cSld>
     <p:spTree>
@@ -4081,7 +4270,7 @@
 </p:sld>
 </file>
 
-<file path=ppt/slides/slide15.xml><?xml version="1.0" encoding="utf-8"?>
+<file path=ppt/slides/slide16.xml><?xml version="1.0" encoding="utf-8"?>
 <p:sld xmlns:a="http://schemas.openxmlformats.org/drawingml/2006/main" xmlns:r="http://schemas.openxmlformats.org/officeDocument/2006/relationships" xmlns:p="http://schemas.openxmlformats.org/presentationml/2006/main">
   <p:cSld>
     <p:spTree>
@@ -4203,7 +4392,7 @@
 </p:sld>
 </file>
 
-<file path=ppt/slides/slide16.xml><?xml version="1.0" encoding="utf-8"?>
+<file path=ppt/slides/slide17.xml><?xml version="1.0" encoding="utf-8"?>
 <p:sld xmlns:a="http://schemas.openxmlformats.org/drawingml/2006/main" xmlns:r="http://schemas.openxmlformats.org/officeDocument/2006/relationships" xmlns:p="http://schemas.openxmlformats.org/presentationml/2006/main">
   <p:cSld>
     <p:spTree>
@@ -4296,7 +4485,7 @@
 </p:sld>
 </file>
 
-<file path=ppt/slides/slide17.xml><?xml version="1.0" encoding="utf-8"?>
+<file path=ppt/slides/slide18.xml><?xml version="1.0" encoding="utf-8"?>
 <p:sld xmlns:a="http://schemas.openxmlformats.org/drawingml/2006/main" xmlns:r="http://schemas.openxmlformats.org/officeDocument/2006/relationships" xmlns:p="http://schemas.openxmlformats.org/presentationml/2006/main">
   <p:cSld>
     <p:spTree>
@@ -7272,87 +7461,94 @@
           <p:nvPr>
             <p:extLst>
               <p:ext uri="{D42A27DB-BD31-4B8C-83A1-F6EECF244321}">
-                <p14:modId xmlns:p14="http://schemas.microsoft.com/office/powerpoint/2010/main" val="2984453544"/>
+                <p14:modId xmlns:p14="http://schemas.microsoft.com/office/powerpoint/2010/main" val="3394746909"/>
               </p:ext>
             </p:extLst>
           </p:nvPr>
         </p:nvGraphicFramePr>
         <p:xfrm>
           <a:off x="205740" y="2901356"/>
-          <a:ext cx="11635740" cy="3160456"/>
+          <a:ext cx="11635740" cy="3221416"/>
         </p:xfrm>
         <a:graphic>
           <a:graphicData uri="http://schemas.openxmlformats.org/drawingml/2006/table">
             <a:tbl>
               <a:tblPr/>
               <a:tblGrid>
-                <a:gridCol w="1403062">
+                <a:gridCol w="1271044">
                   <a:extLst>
                     <a:ext uri="{9D8B030D-6E8A-4147-A177-3AD203B41FA5}">
                       <a16:colId xmlns:a16="http://schemas.microsoft.com/office/drawing/2014/main" val="3444470858"/>
                     </a:ext>
                   </a:extLst>
                 </a:gridCol>
-                <a:gridCol w="1475560">
+                <a:gridCol w="1336721">
                   <a:extLst>
                     <a:ext uri="{9D8B030D-6E8A-4147-A177-3AD203B41FA5}">
                       <a16:colId xmlns:a16="http://schemas.microsoft.com/office/drawing/2014/main" val="998232407"/>
                     </a:ext>
                   </a:extLst>
                 </a:gridCol>
-                <a:gridCol w="1329799">
+                <a:gridCol w="1204675">
                   <a:extLst>
                     <a:ext uri="{9D8B030D-6E8A-4147-A177-3AD203B41FA5}">
                       <a16:colId xmlns:a16="http://schemas.microsoft.com/office/drawing/2014/main" val="2893752305"/>
                     </a:ext>
                   </a:extLst>
                 </a:gridCol>
-                <a:gridCol w="1329799">
+                <a:gridCol w="1204675">
                   <a:extLst>
                     <a:ext uri="{9D8B030D-6E8A-4147-A177-3AD203B41FA5}">
                       <a16:colId xmlns:a16="http://schemas.microsoft.com/office/drawing/2014/main" val="4028848516"/>
                     </a:ext>
                   </a:extLst>
                 </a:gridCol>
-                <a:gridCol w="1548824">
+                <a:gridCol w="1403091">
                   <a:extLst>
                     <a:ext uri="{9D8B030D-6E8A-4147-A177-3AD203B41FA5}">
                       <a16:colId xmlns:a16="http://schemas.microsoft.com/office/drawing/2014/main" val="170455476"/>
                     </a:ext>
                   </a:extLst>
                 </a:gridCol>
-                <a:gridCol w="954327">
+                <a:gridCol w="864532">
                   <a:extLst>
                     <a:ext uri="{9D8B030D-6E8A-4147-A177-3AD203B41FA5}">
                       <a16:colId xmlns:a16="http://schemas.microsoft.com/office/drawing/2014/main" val="1123767496"/>
                     </a:ext>
                   </a:extLst>
                 </a:gridCol>
-                <a:gridCol w="1161619">
+                <a:gridCol w="1052319">
                   <a:extLst>
                     <a:ext uri="{9D8B030D-6E8A-4147-A177-3AD203B41FA5}">
                       <a16:colId xmlns:a16="http://schemas.microsoft.com/office/drawing/2014/main" val="109240599"/>
                     </a:ext>
                   </a:extLst>
                 </a:gridCol>
-                <a:gridCol w="82135">
+                <a:gridCol w="74407">
                   <a:extLst>
                     <a:ext uri="{9D8B030D-6E8A-4147-A177-3AD203B41FA5}">
                       <a16:colId xmlns:a16="http://schemas.microsoft.com/office/drawing/2014/main" val="667118583"/>
                     </a:ext>
                   </a:extLst>
                 </a:gridCol>
-                <a:gridCol w="1142062">
+                <a:gridCol w="1034602">
                   <a:extLst>
                     <a:ext uri="{9D8B030D-6E8A-4147-A177-3AD203B41FA5}">
                       <a16:colId xmlns:a16="http://schemas.microsoft.com/office/drawing/2014/main" val="3258639377"/>
                     </a:ext>
                   </a:extLst>
                 </a:gridCol>
-                <a:gridCol w="1208553">
+                <a:gridCol w="1094837">
                   <a:extLst>
                     <a:ext uri="{9D8B030D-6E8A-4147-A177-3AD203B41FA5}">
                       <a16:colId xmlns:a16="http://schemas.microsoft.com/office/drawing/2014/main" val="1929419975"/>
+                    </a:ext>
+                  </a:extLst>
+                </a:gridCol>
+                <a:gridCol w="1094837">
+                  <a:extLst>
+                    <a:ext uri="{9D8B030D-6E8A-4147-A177-3AD203B41FA5}">
+                      <a16:colId xmlns:a16="http://schemas.microsoft.com/office/drawing/2014/main" val="481683228"/>
                     </a:ext>
                   </a:extLst>
                 </a:gridCol>
@@ -7667,6 +7863,51 @@
                   </a:txBody>
                   <a:tcPr/>
                 </a:tc>
+                <a:tc rowSpan="2">
+                  <a:txBody>
+                    <a:bodyPr/>
+                    <a:lstStyle/>
+                    <a:p>
+                      <a:pPr algn="ctr" fontAlgn="ctr"/>
+                      <a:r>
+                        <a:rPr lang="en-US" sz="1700" b="1" i="0" u="none" strike="noStrike" dirty="0">
+                          <a:solidFill>
+                            <a:srgbClr val="000000"/>
+                          </a:solidFill>
+                          <a:effectLst/>
+                          <a:latin typeface="Calibri" panose="020F0502020204030204" pitchFamily="34" charset="0"/>
+                        </a:rPr>
+                        <a:t>X0 Lambda</a:t>
+                      </a:r>
+                    </a:p>
+                  </a:txBody>
+                  <a:tcPr marL="126591" marR="126591" marT="63296" marB="63296" anchor="ctr">
+                    <a:lnL>
+                      <a:noFill/>
+                    </a:lnL>
+                    <a:lnR>
+                      <a:noFill/>
+                    </a:lnR>
+                    <a:lnT w="6350" cap="flat" cmpd="sng" algn="ctr">
+                      <a:solidFill>
+                        <a:srgbClr val="000000"/>
+                      </a:solidFill>
+                      <a:prstDash val="solid"/>
+                      <a:round/>
+                      <a:headEnd type="none" w="med" len="med"/>
+                      <a:tailEnd type="none" w="med" len="med"/>
+                    </a:lnT>
+                    <a:lnB w="6350" cap="flat" cmpd="sng" algn="ctr">
+                      <a:solidFill>
+                        <a:srgbClr val="000000"/>
+                      </a:solidFill>
+                      <a:prstDash val="solid"/>
+                      <a:round/>
+                      <a:headEnd type="none" w="med" len="med"/>
+                      <a:tailEnd type="none" w="med" len="med"/>
+                    </a:lnB>
+                  </a:tcPr>
+                </a:tc>
                 <a:extLst>
                   <a:ext uri="{0D108BD9-81ED-4DB2-BD59-A6C34878D82A}">
                     <a16:rowId xmlns:a16="http://schemas.microsoft.com/office/drawing/2014/main" val="1909783915"/>
@@ -8094,6 +8335,48 @@
                     </a:lnB>
                   </a:tcPr>
                 </a:tc>
+                <a:tc vMerge="1">
+                  <a:txBody>
+                    <a:bodyPr/>
+                    <a:lstStyle/>
+                    <a:p>
+                      <a:pPr algn="ctr" fontAlgn="ctr"/>
+                      <a:endParaRPr lang="en-US" sz="1700" b="1" i="0" u="none" strike="noStrike" dirty="0">
+                        <a:solidFill>
+                          <a:srgbClr val="000000"/>
+                        </a:solidFill>
+                        <a:effectLst/>
+                        <a:latin typeface="Calibri" panose="020F0502020204030204" pitchFamily="34" charset="0"/>
+                      </a:endParaRPr>
+                    </a:p>
+                  </a:txBody>
+                  <a:tcPr marL="13187" marR="13187" marT="13187" marB="0" anchor="ctr">
+                    <a:lnL>
+                      <a:noFill/>
+                    </a:lnL>
+                    <a:lnR>
+                      <a:noFill/>
+                    </a:lnR>
+                    <a:lnT w="6350" cap="flat" cmpd="sng" algn="ctr">
+                      <a:solidFill>
+                        <a:srgbClr val="000000"/>
+                      </a:solidFill>
+                      <a:prstDash val="solid"/>
+                      <a:round/>
+                      <a:headEnd type="none" w="med" len="med"/>
+                      <a:tailEnd type="none" w="med" len="med"/>
+                    </a:lnT>
+                    <a:lnB w="6350" cap="flat" cmpd="sng" algn="ctr">
+                      <a:solidFill>
+                        <a:srgbClr val="000000"/>
+                      </a:solidFill>
+                      <a:prstDash val="solid"/>
+                      <a:round/>
+                      <a:headEnd type="none" w="med" len="med"/>
+                      <a:tailEnd type="none" w="med" len="med"/>
+                    </a:lnB>
+                  </a:tcPr>
+                </a:tc>
                 <a:extLst>
                   <a:ext uri="{0D108BD9-81ED-4DB2-BD59-A6C34878D82A}">
                     <a16:rowId xmlns:a16="http://schemas.microsoft.com/office/drawing/2014/main" val="4035571152"/>
@@ -8495,6 +8778,69 @@
                         </a:rPr>
                         <a:t>88 (71, 97)</a:t>
                       </a:r>
+                    </a:p>
+                  </a:txBody>
+                  <a:tcPr marL="13187" marR="13187" marT="13187" marB="0" anchor="b">
+                    <a:lnL>
+                      <a:noFill/>
+                    </a:lnL>
+                    <a:lnR>
+                      <a:noFill/>
+                    </a:lnR>
+                    <a:lnT w="6350" cap="flat" cmpd="sng" algn="ctr">
+                      <a:solidFill>
+                        <a:srgbClr val="000000"/>
+                      </a:solidFill>
+                      <a:prstDash val="solid"/>
+                      <a:round/>
+                      <a:headEnd type="none" w="med" len="med"/>
+                      <a:tailEnd type="none" w="med" len="med"/>
+                    </a:lnT>
+                    <a:lnB>
+                      <a:noFill/>
+                    </a:lnB>
+                    <a:solidFill>
+                      <a:srgbClr val="D0CECE"/>
+                    </a:solidFill>
+                  </a:tcPr>
+                </a:tc>
+                <a:tc>
+                  <a:txBody>
+                    <a:bodyPr/>
+                    <a:lstStyle/>
+                    <a:p>
+                      <a:pPr marL="0" marR="0" lvl="0" indent="0" algn="r" defTabSz="914400" rtl="0" eaLnBrk="1" fontAlgn="b" latinLnBrk="0" hangingPunct="1">
+                        <a:lnSpc>
+                          <a:spcPct val="100000"/>
+                        </a:lnSpc>
+                        <a:spcBef>
+                          <a:spcPts val="0"/>
+                        </a:spcBef>
+                        <a:spcAft>
+                          <a:spcPts val="0"/>
+                        </a:spcAft>
+                        <a:buClrTx/>
+                        <a:buSzTx/>
+                        <a:buFontTx/>
+                        <a:buNone/>
+                        <a:tabLst/>
+                        <a:defRPr/>
+                      </a:pPr>
+                      <a:r>
+                        <a:rPr lang="en-US" sz="1800" kern="1200" dirty="0">
+                          <a:solidFill>
+                            <a:schemeClr val="tx1"/>
+                          </a:solidFill>
+                          <a:effectLst/>
+                          <a:latin typeface="+mn-lt"/>
+                          <a:ea typeface="+mn-ea"/>
+                          <a:cs typeface="+mn-cs"/>
+                        </a:rPr>
+                        <a:t>4.08 </a:t>
+                      </a:r>
+                      <a:endParaRPr lang="en-US" sz="1600" dirty="0">
+                        <a:effectLst/>
+                      </a:endParaRPr>
                     </a:p>
                   </a:txBody>
                   <a:tcPr marL="13187" marR="13187" marT="13187" marB="0" anchor="b">
@@ -8855,6 +9201,60 @@
                     </a:lnB>
                   </a:tcPr>
                 </a:tc>
+                <a:tc>
+                  <a:txBody>
+                    <a:bodyPr/>
+                    <a:lstStyle/>
+                    <a:p>
+                      <a:pPr marL="0" marR="0" lvl="0" indent="0" algn="r" defTabSz="914400" rtl="0" eaLnBrk="1" fontAlgn="b" latinLnBrk="0" hangingPunct="1">
+                        <a:lnSpc>
+                          <a:spcPct val="100000"/>
+                        </a:lnSpc>
+                        <a:spcBef>
+                          <a:spcPts val="0"/>
+                        </a:spcBef>
+                        <a:spcAft>
+                          <a:spcPts val="0"/>
+                        </a:spcAft>
+                        <a:buClrTx/>
+                        <a:buSzTx/>
+                        <a:buFontTx/>
+                        <a:buNone/>
+                        <a:tabLst/>
+                        <a:defRPr/>
+                      </a:pPr>
+                      <a:r>
+                        <a:rPr lang="en-US" sz="1800" kern="1200" dirty="0">
+                          <a:solidFill>
+                            <a:schemeClr val="tx1"/>
+                          </a:solidFill>
+                          <a:effectLst/>
+                          <a:latin typeface="+mn-lt"/>
+                          <a:ea typeface="+mn-ea"/>
+                          <a:cs typeface="+mn-cs"/>
+                        </a:rPr>
+                        <a:t>2.72 </a:t>
+                      </a:r>
+                      <a:endParaRPr lang="en-US" sz="1600" dirty="0">
+                        <a:effectLst/>
+                      </a:endParaRPr>
+                    </a:p>
+                  </a:txBody>
+                  <a:tcPr marL="13187" marR="13187" marT="13187" marB="0" anchor="b">
+                    <a:lnL>
+                      <a:noFill/>
+                    </a:lnL>
+                    <a:lnR>
+                      <a:noFill/>
+                    </a:lnR>
+                    <a:lnT>
+                      <a:noFill/>
+                    </a:lnT>
+                    <a:lnB>
+                      <a:noFill/>
+                    </a:lnB>
+                  </a:tcPr>
+                </a:tc>
                 <a:extLst>
                   <a:ext uri="{0D108BD9-81ED-4DB2-BD59-A6C34878D82A}">
                     <a16:rowId xmlns:a16="http://schemas.microsoft.com/office/drawing/2014/main" val="801422344"/>
@@ -9222,6 +9622,63 @@
                     </a:solidFill>
                   </a:tcPr>
                 </a:tc>
+                <a:tc>
+                  <a:txBody>
+                    <a:bodyPr/>
+                    <a:lstStyle/>
+                    <a:p>
+                      <a:pPr marL="0" marR="0" lvl="0" indent="0" algn="r" defTabSz="914400" rtl="0" eaLnBrk="1" fontAlgn="b" latinLnBrk="0" hangingPunct="1">
+                        <a:lnSpc>
+                          <a:spcPct val="100000"/>
+                        </a:lnSpc>
+                        <a:spcBef>
+                          <a:spcPts val="0"/>
+                        </a:spcBef>
+                        <a:spcAft>
+                          <a:spcPts val="0"/>
+                        </a:spcAft>
+                        <a:buClrTx/>
+                        <a:buSzTx/>
+                        <a:buFontTx/>
+                        <a:buNone/>
+                        <a:tabLst/>
+                        <a:defRPr/>
+                      </a:pPr>
+                      <a:r>
+                        <a:rPr lang="en-US" sz="1800" kern="1200" dirty="0">
+                          <a:solidFill>
+                            <a:schemeClr val="tx1"/>
+                          </a:solidFill>
+                          <a:effectLst/>
+                          <a:latin typeface="+mn-lt"/>
+                          <a:ea typeface="+mn-ea"/>
+                          <a:cs typeface="+mn-cs"/>
+                        </a:rPr>
+                        <a:t>2.06 </a:t>
+                      </a:r>
+                      <a:endParaRPr lang="en-US" sz="1600" dirty="0">
+                        <a:effectLst/>
+                      </a:endParaRPr>
+                    </a:p>
+                  </a:txBody>
+                  <a:tcPr marL="13187" marR="13187" marT="13187" marB="0" anchor="b">
+                    <a:lnL>
+                      <a:noFill/>
+                    </a:lnL>
+                    <a:lnR>
+                      <a:noFill/>
+                    </a:lnR>
+                    <a:lnT>
+                      <a:noFill/>
+                    </a:lnT>
+                    <a:lnB>
+                      <a:noFill/>
+                    </a:lnB>
+                    <a:solidFill>
+                      <a:srgbClr val="D0CECE"/>
+                    </a:solidFill>
+                  </a:tcPr>
+                </a:tc>
                 <a:extLst>
                   <a:ext uri="{0D108BD9-81ED-4DB2-BD59-A6C34878D82A}">
                     <a16:rowId xmlns:a16="http://schemas.microsoft.com/office/drawing/2014/main" val="3110762303"/>
@@ -9596,6 +10053,66 @@
                         </a:rPr>
                         <a:t>0 (0,100)</a:t>
                       </a:r>
+                    </a:p>
+                  </a:txBody>
+                  <a:tcPr marL="13187" marR="13187" marT="13187" marB="0" anchor="b">
+                    <a:lnL>
+                      <a:noFill/>
+                    </a:lnL>
+                    <a:lnR>
+                      <a:noFill/>
+                    </a:lnR>
+                    <a:lnT>
+                      <a:noFill/>
+                    </a:lnT>
+                    <a:lnB w="12700" cap="flat" cmpd="sng" algn="ctr">
+                      <a:solidFill>
+                        <a:schemeClr val="tx1"/>
+                      </a:solidFill>
+                      <a:prstDash val="solid"/>
+                      <a:round/>
+                      <a:headEnd type="none" w="med" len="med"/>
+                      <a:tailEnd type="none" w="med" len="med"/>
+                    </a:lnB>
+                  </a:tcPr>
+                </a:tc>
+                <a:tc>
+                  <a:txBody>
+                    <a:bodyPr/>
+                    <a:lstStyle/>
+                    <a:p>
+                      <a:pPr marL="0" marR="0" lvl="0" indent="0" algn="r" defTabSz="914400" rtl="0" eaLnBrk="1" fontAlgn="b" latinLnBrk="0" hangingPunct="1">
+                        <a:lnSpc>
+                          <a:spcPct val="100000"/>
+                        </a:lnSpc>
+                        <a:spcBef>
+                          <a:spcPts val="0"/>
+                        </a:spcBef>
+                        <a:spcAft>
+                          <a:spcPts val="0"/>
+                        </a:spcAft>
+                        <a:buClrTx/>
+                        <a:buSzTx/>
+                        <a:buFontTx/>
+                        <a:buNone/>
+                        <a:tabLst/>
+                        <a:defRPr/>
+                      </a:pPr>
+                      <a:r>
+                        <a:rPr lang="en-US" sz="1800" kern="1200">
+                          <a:solidFill>
+                            <a:schemeClr val="tx1"/>
+                          </a:solidFill>
+                          <a:effectLst/>
+                          <a:latin typeface="+mn-lt"/>
+                          <a:ea typeface="+mn-ea"/>
+                          <a:cs typeface="+mn-cs"/>
+                        </a:rPr>
+                        <a:t>2.38 </a:t>
+                      </a:r>
+                      <a:endParaRPr lang="en-US" sz="1600">
+                        <a:effectLst/>
+                      </a:endParaRPr>
                     </a:p>
                   </a:txBody>
                   <a:tcPr marL="13187" marR="13187" marT="13187" marB="0" anchor="b">
@@ -9989,6 +10506,54 @@
                       <a:headEnd type="none" w="med" len="med"/>
                       <a:tailEnd type="none" w="med" len="med"/>
                     </a:lnB>
+                  </a:tcPr>
+                </a:tc>
+                <a:tc>
+                  <a:txBody>
+                    <a:bodyPr/>
+                    <a:lstStyle/>
+                    <a:p>
+                      <a:pPr algn="l" fontAlgn="b"/>
+                      <a:endParaRPr lang="en-US" sz="1200" b="0" i="0" u="none" strike="noStrike" dirty="0">
+                        <a:solidFill>
+                          <a:srgbClr val="000000"/>
+                        </a:solidFill>
+                        <a:effectLst/>
+                        <a:latin typeface="Calibri" panose="020F0502020204030204" pitchFamily="34" charset="0"/>
+                      </a:endParaRPr>
+                    </a:p>
+                  </a:txBody>
+                  <a:tcPr marL="13187" marR="13187" marT="13187" marB="0" anchor="b">
+                    <a:lnL>
+                      <a:noFill/>
+                    </a:lnL>
+                    <a:lnR>
+                      <a:noFill/>
+                    </a:lnR>
+                    <a:lnT w="12700" cap="flat" cmpd="sng" algn="ctr">
+                      <a:solidFill>
+                        <a:schemeClr val="tx1"/>
+                      </a:solidFill>
+                      <a:prstDash val="solid"/>
+                      <a:round/>
+                      <a:headEnd type="none" w="med" len="med"/>
+                      <a:tailEnd type="none" w="med" len="med"/>
+                    </a:lnT>
+                    <a:lnB w="6350" cap="flat" cmpd="sng" algn="ctr">
+                      <a:noFill/>
+                      <a:prstDash val="solid"/>
+                      <a:round/>
+                      <a:headEnd type="none" w="med" len="med"/>
+                      <a:tailEnd type="none" w="med" len="med"/>
+                    </a:lnB>
+                    <a:lnTlToBr w="12700" cmpd="sng">
+                      <a:noFill/>
+                      <a:prstDash val="solid"/>
+                    </a:lnTlToBr>
+                    <a:lnBlToTr w="12700" cmpd="sng">
+                      <a:noFill/>
+                      <a:prstDash val="solid"/>
+                    </a:lnBlToTr>
                   </a:tcPr>
                 </a:tc>
                 <a:extLst>
@@ -10015,6 +10580,3495 @@
 </file>
 
 <file path=ppt/slides/slide4.xml><?xml version="1.0" encoding="utf-8"?>
+<p:sld xmlns:a="http://schemas.openxmlformats.org/drawingml/2006/main" xmlns:r="http://schemas.openxmlformats.org/officeDocument/2006/relationships" xmlns:p="http://schemas.openxmlformats.org/presentationml/2006/main">
+  <p:cSld>
+    <p:spTree>
+      <p:nvGrpSpPr>
+        <p:cNvPr id="1" name=""/>
+        <p:cNvGrpSpPr/>
+        <p:nvPr/>
+      </p:nvGrpSpPr>
+      <p:grpSpPr>
+        <a:xfrm>
+          <a:off x="0" y="0"/>
+          <a:ext cx="0" cy="0"/>
+          <a:chOff x="0" y="0"/>
+          <a:chExt cx="0" cy="0"/>
+        </a:xfrm>
+      </p:grpSpPr>
+      <p:sp>
+        <p:nvSpPr>
+          <p:cNvPr id="2" name="Title 1">
+            <a:extLst>
+              <a:ext uri="{FF2B5EF4-FFF2-40B4-BE49-F238E27FC236}">
+                <a16:creationId xmlns:a16="http://schemas.microsoft.com/office/drawing/2014/main" id="{4B5B7B39-F324-02CE-A57F-E2503197EDA8}"/>
+              </a:ext>
+            </a:extLst>
+          </p:cNvPr>
+          <p:cNvSpPr>
+            <a:spLocks noGrp="1"/>
+          </p:cNvSpPr>
+          <p:nvPr>
+            <p:ph type="title"/>
+          </p:nvPr>
+        </p:nvSpPr>
+        <p:spPr/>
+        <p:txBody>
+          <a:bodyPr/>
+          <a:lstStyle/>
+          <a:p>
+            <a:r>
+              <a:rPr lang="en-US" dirty="0"/>
+              <a:t>Summary with updated pdf for mu and tau</a:t>
+            </a:r>
+          </a:p>
+        </p:txBody>
+      </p:sp>
+      <p:graphicFrame>
+        <p:nvGraphicFramePr>
+          <p:cNvPr id="3" name="Table 2">
+            <a:extLst>
+              <a:ext uri="{FF2B5EF4-FFF2-40B4-BE49-F238E27FC236}">
+                <a16:creationId xmlns:a16="http://schemas.microsoft.com/office/drawing/2014/main" id="{2CED0F31-5FE1-3961-573F-0BCBB9AE0DD8}"/>
+              </a:ext>
+            </a:extLst>
+          </p:cNvPr>
+          <p:cNvGraphicFramePr>
+            <a:graphicFrameLocks noGrp="1"/>
+          </p:cNvGraphicFramePr>
+          <p:nvPr>
+            <p:extLst>
+              <p:ext uri="{D42A27DB-BD31-4B8C-83A1-F6EECF244321}">
+                <p14:modId xmlns:p14="http://schemas.microsoft.com/office/powerpoint/2010/main" val="3613845158"/>
+              </p:ext>
+            </p:extLst>
+          </p:nvPr>
+        </p:nvGraphicFramePr>
+        <p:xfrm>
+          <a:off x="195935" y="1945860"/>
+          <a:ext cx="11855652" cy="3830509"/>
+        </p:xfrm>
+        <a:graphic>
+          <a:graphicData uri="http://schemas.openxmlformats.org/drawingml/2006/table">
+            <a:tbl>
+              <a:tblPr/>
+              <a:tblGrid>
+                <a:gridCol w="1139705">
+                  <a:extLst>
+                    <a:ext uri="{9D8B030D-6E8A-4147-A177-3AD203B41FA5}">
+                      <a16:colId xmlns:a16="http://schemas.microsoft.com/office/drawing/2014/main" val="3444470858"/>
+                    </a:ext>
+                  </a:extLst>
+                </a:gridCol>
+                <a:gridCol w="1150706">
+                  <a:extLst>
+                    <a:ext uri="{9D8B030D-6E8A-4147-A177-3AD203B41FA5}">
+                      <a16:colId xmlns:a16="http://schemas.microsoft.com/office/drawing/2014/main" val="998232407"/>
+                    </a:ext>
+                  </a:extLst>
+                </a:gridCol>
+                <a:gridCol w="1058238">
+                  <a:extLst>
+                    <a:ext uri="{9D8B030D-6E8A-4147-A177-3AD203B41FA5}">
+                      <a16:colId xmlns:a16="http://schemas.microsoft.com/office/drawing/2014/main" val="2893752305"/>
+                    </a:ext>
+                  </a:extLst>
+                </a:gridCol>
+                <a:gridCol w="1191803">
+                  <a:extLst>
+                    <a:ext uri="{9D8B030D-6E8A-4147-A177-3AD203B41FA5}">
+                      <a16:colId xmlns:a16="http://schemas.microsoft.com/office/drawing/2014/main" val="4028848516"/>
+                    </a:ext>
+                  </a:extLst>
+                </a:gridCol>
+                <a:gridCol w="1150705">
+                  <a:extLst>
+                    <a:ext uri="{9D8B030D-6E8A-4147-A177-3AD203B41FA5}">
+                      <a16:colId xmlns:a16="http://schemas.microsoft.com/office/drawing/2014/main" val="170455476"/>
+                    </a:ext>
+                  </a:extLst>
+                </a:gridCol>
+                <a:gridCol w="1058238">
+                  <a:extLst>
+                    <a:ext uri="{9D8B030D-6E8A-4147-A177-3AD203B41FA5}">
+                      <a16:colId xmlns:a16="http://schemas.microsoft.com/office/drawing/2014/main" val="1123767496"/>
+                    </a:ext>
+                  </a:extLst>
+                </a:gridCol>
+                <a:gridCol w="1376737">
+                  <a:extLst>
+                    <a:ext uri="{9D8B030D-6E8A-4147-A177-3AD203B41FA5}">
+                      <a16:colId xmlns:a16="http://schemas.microsoft.com/office/drawing/2014/main" val="109240599"/>
+                    </a:ext>
+                  </a:extLst>
+                </a:gridCol>
+                <a:gridCol w="61645">
+                  <a:extLst>
+                    <a:ext uri="{9D8B030D-6E8A-4147-A177-3AD203B41FA5}">
+                      <a16:colId xmlns:a16="http://schemas.microsoft.com/office/drawing/2014/main" val="667118583"/>
+                    </a:ext>
+                  </a:extLst>
+                </a:gridCol>
+                <a:gridCol w="1294544">
+                  <a:extLst>
+                    <a:ext uri="{9D8B030D-6E8A-4147-A177-3AD203B41FA5}">
+                      <a16:colId xmlns:a16="http://schemas.microsoft.com/office/drawing/2014/main" val="3258639377"/>
+                    </a:ext>
+                  </a:extLst>
+                </a:gridCol>
+                <a:gridCol w="1304818">
+                  <a:extLst>
+                    <a:ext uri="{9D8B030D-6E8A-4147-A177-3AD203B41FA5}">
+                      <a16:colId xmlns:a16="http://schemas.microsoft.com/office/drawing/2014/main" val="1929419975"/>
+                    </a:ext>
+                  </a:extLst>
+                </a:gridCol>
+                <a:gridCol w="1068513">
+                  <a:extLst>
+                    <a:ext uri="{9D8B030D-6E8A-4147-A177-3AD203B41FA5}">
+                      <a16:colId xmlns:a16="http://schemas.microsoft.com/office/drawing/2014/main" val="957295039"/>
+                    </a:ext>
+                  </a:extLst>
+                </a:gridCol>
+              </a:tblGrid>
+              <a:tr h="617137">
+                <a:tc rowSpan="2">
+                  <a:txBody>
+                    <a:bodyPr/>
+                    <a:lstStyle/>
+                    <a:p>
+                      <a:pPr algn="l" fontAlgn="b"/>
+                      <a:r>
+                        <a:rPr lang="en-US" sz="1700" b="0" i="0" u="none" strike="noStrike" dirty="0">
+                          <a:solidFill>
+                            <a:srgbClr val="000000"/>
+                          </a:solidFill>
+                          <a:effectLst/>
+                          <a:latin typeface="Calibri" panose="020F0502020204030204" pitchFamily="34" charset="0"/>
+                        </a:rPr>
+                        <a:t> </a:t>
+                      </a:r>
+                    </a:p>
+                    <a:p>
+                      <a:pPr algn="ctr" fontAlgn="ctr"/>
+                      <a:r>
+                        <a:rPr lang="en-US" sz="1700" b="1" i="0" u="none" strike="noStrike" dirty="0">
+                          <a:solidFill>
+                            <a:srgbClr val="000000"/>
+                          </a:solidFill>
+                          <a:effectLst/>
+                          <a:latin typeface="Calibri" panose="020F0502020204030204" pitchFamily="34" charset="0"/>
+                        </a:rPr>
+                        <a:t>experimental condition</a:t>
+                      </a:r>
+                    </a:p>
+                  </a:txBody>
+                  <a:tcPr marL="13187" marR="13187" marT="13187" marB="0" anchor="ctr">
+                    <a:lnL>
+                      <a:noFill/>
+                    </a:lnL>
+                    <a:lnR>
+                      <a:noFill/>
+                    </a:lnR>
+                    <a:lnT w="6350" cap="flat" cmpd="sng" algn="ctr">
+                      <a:solidFill>
+                        <a:srgbClr val="000000"/>
+                      </a:solidFill>
+                      <a:prstDash val="solid"/>
+                      <a:round/>
+                      <a:headEnd type="none" w="med" len="med"/>
+                      <a:tailEnd type="none" w="med" len="med"/>
+                    </a:lnT>
+                    <a:lnB w="6350" cap="flat" cmpd="sng" algn="ctr">
+                      <a:solidFill>
+                        <a:srgbClr val="000000"/>
+                      </a:solidFill>
+                      <a:prstDash val="solid"/>
+                      <a:round/>
+                      <a:headEnd type="none" w="med" len="med"/>
+                      <a:tailEnd type="none" w="med" len="med"/>
+                    </a:lnB>
+                  </a:tcPr>
+                </a:tc>
+                <a:tc rowSpan="2">
+                  <a:txBody>
+                    <a:bodyPr/>
+                    <a:lstStyle/>
+                    <a:p>
+                      <a:pPr algn="l" fontAlgn="b"/>
+                      <a:r>
+                        <a:rPr lang="en-US" sz="1700" b="0" i="0" u="none" strike="noStrike" dirty="0">
+                          <a:solidFill>
+                            <a:srgbClr val="000000"/>
+                          </a:solidFill>
+                          <a:effectLst/>
+                          <a:latin typeface="Calibri" panose="020F0502020204030204" pitchFamily="34" charset="0"/>
+                        </a:rPr>
+                        <a:t> </a:t>
+                      </a:r>
+                    </a:p>
+                    <a:p>
+                      <a:pPr algn="ctr" fontAlgn="ctr"/>
+                      <a:r>
+                        <a:rPr lang="en-US" sz="1700" b="1" i="0" u="none" strike="noStrike" dirty="0">
+                          <a:solidFill>
+                            <a:srgbClr val="000000"/>
+                          </a:solidFill>
+                          <a:effectLst/>
+                          <a:latin typeface="Calibri" panose="020F0502020204030204" pitchFamily="34" charset="0"/>
+                        </a:rPr>
+                        <a:t>number of clusters with intensity data</a:t>
+                      </a:r>
+                    </a:p>
+                  </a:txBody>
+                  <a:tcPr marL="13187" marR="13187" marT="13187" marB="0" anchor="ctr">
+                    <a:lnL>
+                      <a:noFill/>
+                    </a:lnL>
+                    <a:lnR>
+                      <a:noFill/>
+                    </a:lnR>
+                    <a:lnT w="6350" cap="flat" cmpd="sng" algn="ctr">
+                      <a:solidFill>
+                        <a:srgbClr val="000000"/>
+                      </a:solidFill>
+                      <a:prstDash val="solid"/>
+                      <a:round/>
+                      <a:headEnd type="none" w="med" len="med"/>
+                      <a:tailEnd type="none" w="med" len="med"/>
+                    </a:lnT>
+                    <a:lnB w="6350" cap="flat" cmpd="sng" algn="ctr">
+                      <a:solidFill>
+                        <a:srgbClr val="000000"/>
+                      </a:solidFill>
+                      <a:prstDash val="solid"/>
+                      <a:round/>
+                      <a:headEnd type="none" w="med" len="med"/>
+                      <a:tailEnd type="none" w="med" len="med"/>
+                    </a:lnB>
+                  </a:tcPr>
+                </a:tc>
+                <a:tc rowSpan="2">
+                  <a:txBody>
+                    <a:bodyPr/>
+                    <a:lstStyle/>
+                    <a:p>
+                      <a:pPr algn="ctr" fontAlgn="ctr"/>
+                      <a:r>
+                        <a:rPr lang="en-US" sz="1700" b="1" i="0" u="none" strike="noStrike" dirty="0">
+                          <a:solidFill>
+                            <a:srgbClr val="000000"/>
+                          </a:solidFill>
+                          <a:effectLst/>
+                          <a:latin typeface="Calibri" panose="020F0502020204030204" pitchFamily="34" charset="0"/>
+                        </a:rPr>
+                        <a:t>number of daughter cell pairs</a:t>
+                      </a:r>
+                    </a:p>
+                  </a:txBody>
+                  <a:tcPr marL="13187" marR="13187" marT="13187" marB="0" anchor="ctr">
+                    <a:lnL>
+                      <a:noFill/>
+                    </a:lnL>
+                    <a:lnR>
+                      <a:noFill/>
+                    </a:lnR>
+                    <a:lnT w="6350" cap="flat" cmpd="sng" algn="ctr">
+                      <a:solidFill>
+                        <a:srgbClr val="000000"/>
+                      </a:solidFill>
+                      <a:prstDash val="solid"/>
+                      <a:round/>
+                      <a:headEnd type="none" w="med" len="med"/>
+                      <a:tailEnd type="none" w="med" len="med"/>
+                    </a:lnT>
+                    <a:lnB w="6350" cap="flat" cmpd="sng" algn="ctr">
+                      <a:solidFill>
+                        <a:srgbClr val="000000"/>
+                      </a:solidFill>
+                      <a:prstDash val="solid"/>
+                      <a:round/>
+                      <a:headEnd type="none" w="med" len="med"/>
+                      <a:tailEnd type="none" w="med" len="med"/>
+                    </a:lnB>
+                  </a:tcPr>
+                </a:tc>
+                <a:tc rowSpan="2">
+                  <a:txBody>
+                    <a:bodyPr/>
+                    <a:lstStyle/>
+                    <a:p>
+                      <a:pPr algn="ctr" fontAlgn="ctr"/>
+                      <a:r>
+                        <a:rPr lang="en-US" sz="1700" b="1" i="0" u="none" strike="noStrike" dirty="0">
+                          <a:solidFill>
+                            <a:srgbClr val="000000"/>
+                          </a:solidFill>
+                          <a:effectLst/>
+                          <a:latin typeface="Calibri" panose="020F0502020204030204" pitchFamily="34" charset="0"/>
+                        </a:rPr>
+                        <a:t>number of non-dividing cells </a:t>
+                      </a:r>
+                    </a:p>
+                  </a:txBody>
+                  <a:tcPr marL="13187" marR="13187" marT="13187" marB="0" anchor="ctr">
+                    <a:lnL>
+                      <a:noFill/>
+                    </a:lnL>
+                    <a:lnR>
+                      <a:noFill/>
+                    </a:lnR>
+                    <a:lnT w="6350" cap="flat" cmpd="sng" algn="ctr">
+                      <a:solidFill>
+                        <a:srgbClr val="000000"/>
+                      </a:solidFill>
+                      <a:prstDash val="solid"/>
+                      <a:round/>
+                      <a:headEnd type="none" w="med" len="med"/>
+                      <a:tailEnd type="none" w="med" len="med"/>
+                    </a:lnT>
+                    <a:lnB w="6350" cap="flat" cmpd="sng" algn="ctr">
+                      <a:solidFill>
+                        <a:srgbClr val="000000"/>
+                      </a:solidFill>
+                      <a:prstDash val="solid"/>
+                      <a:round/>
+                      <a:headEnd type="none" w="med" len="med"/>
+                      <a:tailEnd type="none" w="med" len="med"/>
+                    </a:lnB>
+                  </a:tcPr>
+                </a:tc>
+                <a:tc gridSpan="3">
+                  <a:txBody>
+                    <a:bodyPr/>
+                    <a:lstStyle/>
+                    <a:p>
+                      <a:pPr algn="ctr" fontAlgn="ctr"/>
+                      <a:r>
+                        <a:rPr lang="en-US" sz="1700" b="1" i="0" u="none" strike="noStrike" dirty="0">
+                          <a:solidFill>
+                            <a:srgbClr val="000000"/>
+                          </a:solidFill>
+                          <a:effectLst/>
+                          <a:latin typeface="Calibri" panose="020F0502020204030204" pitchFamily="34" charset="0"/>
+                        </a:rPr>
+                        <a:t>Parameters describing the fluorescence intensity of a single episome*</a:t>
+                      </a:r>
+                    </a:p>
+                  </a:txBody>
+                  <a:tcPr marL="126591" marR="126591" marT="63296" marB="63296" anchor="ctr">
+                    <a:lnL>
+                      <a:noFill/>
+                    </a:lnL>
+                    <a:lnR>
+                      <a:noFill/>
+                    </a:lnR>
+                    <a:lnT w="6350" cap="flat" cmpd="sng" algn="ctr">
+                      <a:solidFill>
+                        <a:srgbClr val="000000"/>
+                      </a:solidFill>
+                      <a:prstDash val="solid"/>
+                      <a:round/>
+                      <a:headEnd type="none" w="med" len="med"/>
+                      <a:tailEnd type="none" w="med" len="med"/>
+                    </a:lnT>
+                    <a:lnB w="6350" cap="flat" cmpd="sng" algn="ctr">
+                      <a:solidFill>
+                        <a:srgbClr val="000000"/>
+                      </a:solidFill>
+                      <a:prstDash val="solid"/>
+                      <a:round/>
+                      <a:headEnd type="none" w="med" len="med"/>
+                      <a:tailEnd type="none" w="med" len="med"/>
+                    </a:lnB>
+                  </a:tcPr>
+                </a:tc>
+                <a:tc hMerge="1">
+                  <a:txBody>
+                    <a:bodyPr/>
+                    <a:lstStyle/>
+                    <a:p>
+                      <a:endParaRPr lang="en-US"/>
+                    </a:p>
+                  </a:txBody>
+                  <a:tcPr/>
+                </a:tc>
+                <a:tc hMerge="1">
+                  <a:txBody>
+                    <a:bodyPr/>
+                    <a:lstStyle/>
+                    <a:p>
+                      <a:endParaRPr lang="en-US"/>
+                    </a:p>
+                  </a:txBody>
+                  <a:tcPr/>
+                </a:tc>
+                <a:tc>
+                  <a:txBody>
+                    <a:bodyPr/>
+                    <a:lstStyle/>
+                    <a:p>
+                      <a:pPr algn="ctr" fontAlgn="ctr"/>
+                      <a:r>
+                        <a:rPr lang="en-US" sz="1700" b="1" i="0" u="none" strike="noStrike">
+                          <a:solidFill>
+                            <a:srgbClr val="000000"/>
+                          </a:solidFill>
+                          <a:effectLst/>
+                          <a:latin typeface="Calibri" panose="020F0502020204030204" pitchFamily="34" charset="0"/>
+                        </a:rPr>
+                        <a:t> </a:t>
+                      </a:r>
+                    </a:p>
+                  </a:txBody>
+                  <a:tcPr marL="13187" marR="13187" marT="13187" marB="0" anchor="ctr">
+                    <a:lnL>
+                      <a:noFill/>
+                    </a:lnL>
+                    <a:lnR>
+                      <a:noFill/>
+                    </a:lnR>
+                    <a:lnT w="6350" cap="flat" cmpd="sng" algn="ctr">
+                      <a:solidFill>
+                        <a:srgbClr val="000000"/>
+                      </a:solidFill>
+                      <a:prstDash val="solid"/>
+                      <a:round/>
+                      <a:headEnd type="none" w="med" len="med"/>
+                      <a:tailEnd type="none" w="med" len="med"/>
+                    </a:lnT>
+                    <a:lnB>
+                      <a:noFill/>
+                    </a:lnB>
+                  </a:tcPr>
+                </a:tc>
+                <a:tc gridSpan="2">
+                  <a:txBody>
+                    <a:bodyPr/>
+                    <a:lstStyle/>
+                    <a:p>
+                      <a:pPr algn="ctr" fontAlgn="ctr"/>
+                      <a:r>
+                        <a:rPr lang="en-US" sz="1700" b="1" i="0" u="none" strike="noStrike" dirty="0">
+                          <a:solidFill>
+                            <a:srgbClr val="000000"/>
+                          </a:solidFill>
+                          <a:effectLst/>
+                          <a:latin typeface="Calibri" panose="020F0502020204030204" pitchFamily="34" charset="0"/>
+                        </a:rPr>
+                        <a:t>MLE results</a:t>
+                      </a:r>
+                    </a:p>
+                  </a:txBody>
+                  <a:tcPr marL="126591" marR="126591" marT="63296" marB="63296" anchor="ctr">
+                    <a:lnL>
+                      <a:noFill/>
+                    </a:lnL>
+                    <a:lnR>
+                      <a:noFill/>
+                    </a:lnR>
+                    <a:lnT w="6350" cap="flat" cmpd="sng" algn="ctr">
+                      <a:solidFill>
+                        <a:srgbClr val="000000"/>
+                      </a:solidFill>
+                      <a:prstDash val="solid"/>
+                      <a:round/>
+                      <a:headEnd type="none" w="med" len="med"/>
+                      <a:tailEnd type="none" w="med" len="med"/>
+                    </a:lnT>
+                    <a:lnB w="6350" cap="flat" cmpd="sng" algn="ctr">
+                      <a:solidFill>
+                        <a:srgbClr val="000000"/>
+                      </a:solidFill>
+                      <a:prstDash val="solid"/>
+                      <a:round/>
+                      <a:headEnd type="none" w="med" len="med"/>
+                      <a:tailEnd type="none" w="med" len="med"/>
+                    </a:lnB>
+                  </a:tcPr>
+                </a:tc>
+                <a:tc hMerge="1">
+                  <a:txBody>
+                    <a:bodyPr/>
+                    <a:lstStyle/>
+                    <a:p>
+                      <a:endParaRPr lang="en-US"/>
+                    </a:p>
+                  </a:txBody>
+                  <a:tcPr/>
+                </a:tc>
+                <a:tc rowSpan="2">
+                  <a:txBody>
+                    <a:bodyPr/>
+                    <a:lstStyle/>
+                    <a:p>
+                      <a:pPr marL="0" marR="0" lvl="0" indent="0" algn="ctr" defTabSz="914400" rtl="0" eaLnBrk="1" fontAlgn="ctr" latinLnBrk="0" hangingPunct="1">
+                        <a:lnSpc>
+                          <a:spcPct val="100000"/>
+                        </a:lnSpc>
+                        <a:spcBef>
+                          <a:spcPts val="0"/>
+                        </a:spcBef>
+                        <a:spcAft>
+                          <a:spcPts val="0"/>
+                        </a:spcAft>
+                        <a:buClrTx/>
+                        <a:buSzTx/>
+                        <a:buFontTx/>
+                        <a:buNone/>
+                        <a:tabLst/>
+                        <a:defRPr/>
+                      </a:pPr>
+                      <a:r>
+                        <a:rPr lang="en-US" sz="1700" b="1" i="0" u="none" strike="noStrike" dirty="0">
+                          <a:solidFill>
+                            <a:srgbClr val="000000"/>
+                          </a:solidFill>
+                          <a:effectLst/>
+                          <a:latin typeface="Calibri" panose="020F0502020204030204" pitchFamily="34" charset="0"/>
+                        </a:rPr>
+                        <a:t>X0 Lambda</a:t>
+                      </a:r>
+                    </a:p>
+                    <a:p>
+                      <a:pPr algn="ctr" fontAlgn="ctr"/>
+                      <a:endParaRPr lang="en-US" sz="1700" b="1" i="0" u="none" strike="noStrike" dirty="0">
+                        <a:solidFill>
+                          <a:srgbClr val="000000"/>
+                        </a:solidFill>
+                        <a:effectLst/>
+                        <a:latin typeface="Calibri" panose="020F0502020204030204" pitchFamily="34" charset="0"/>
+                      </a:endParaRPr>
+                    </a:p>
+                  </a:txBody>
+                  <a:tcPr marL="126591" marR="126591" marT="63296" marB="63296" anchor="ctr">
+                    <a:lnL>
+                      <a:noFill/>
+                    </a:lnL>
+                    <a:lnR>
+                      <a:noFill/>
+                    </a:lnR>
+                    <a:lnT w="6350" cap="flat" cmpd="sng" algn="ctr">
+                      <a:solidFill>
+                        <a:srgbClr val="000000"/>
+                      </a:solidFill>
+                      <a:prstDash val="solid"/>
+                      <a:round/>
+                      <a:headEnd type="none" w="med" len="med"/>
+                      <a:tailEnd type="none" w="med" len="med"/>
+                    </a:lnT>
+                    <a:lnB w="6350" cap="flat" cmpd="sng" algn="ctr">
+                      <a:solidFill>
+                        <a:srgbClr val="000000"/>
+                      </a:solidFill>
+                      <a:prstDash val="solid"/>
+                      <a:round/>
+                      <a:headEnd type="none" w="med" len="med"/>
+                      <a:tailEnd type="none" w="med" len="med"/>
+                    </a:lnB>
+                  </a:tcPr>
+                </a:tc>
+                <a:extLst>
+                  <a:ext uri="{0D108BD9-81ED-4DB2-BD59-A6C34878D82A}">
+                    <a16:rowId xmlns:a16="http://schemas.microsoft.com/office/drawing/2014/main" val="1909783915"/>
+                  </a:ext>
+                </a:extLst>
+              </a:tr>
+              <a:tr h="900686">
+                <a:tc vMerge="1">
+                  <a:txBody>
+                    <a:bodyPr/>
+                    <a:lstStyle/>
+                    <a:p>
+                      <a:pPr algn="ctr" fontAlgn="ctr"/>
+                      <a:r>
+                        <a:rPr lang="en-US" sz="1700" b="1" i="0" u="none" strike="noStrike" dirty="0">
+                          <a:solidFill>
+                            <a:srgbClr val="000000"/>
+                          </a:solidFill>
+                          <a:effectLst/>
+                          <a:latin typeface="Calibri" panose="020F0502020204030204" pitchFamily="34" charset="0"/>
+                        </a:rPr>
+                        <a:t>experimental condition</a:t>
+                      </a:r>
+                    </a:p>
+                  </a:txBody>
+                  <a:tcPr marL="13187" marR="13187" marT="13187" marB="0" anchor="ctr">
+                    <a:lnL>
+                      <a:noFill/>
+                    </a:lnL>
+                    <a:lnR>
+                      <a:noFill/>
+                    </a:lnR>
+                    <a:lnT>
+                      <a:noFill/>
+                    </a:lnT>
+                    <a:lnB w="6350" cap="flat" cmpd="sng" algn="ctr">
+                      <a:solidFill>
+                        <a:srgbClr val="000000"/>
+                      </a:solidFill>
+                      <a:prstDash val="solid"/>
+                      <a:round/>
+                      <a:headEnd type="none" w="med" len="med"/>
+                      <a:tailEnd type="none" w="med" len="med"/>
+                    </a:lnB>
+                  </a:tcPr>
+                </a:tc>
+                <a:tc vMerge="1">
+                  <a:txBody>
+                    <a:bodyPr/>
+                    <a:lstStyle/>
+                    <a:p>
+                      <a:pPr algn="ctr" fontAlgn="ctr"/>
+                      <a:r>
+                        <a:rPr lang="en-US" sz="1700" b="1" i="0" u="none" strike="noStrike" dirty="0">
+                          <a:solidFill>
+                            <a:srgbClr val="000000"/>
+                          </a:solidFill>
+                          <a:effectLst/>
+                          <a:latin typeface="Calibri" panose="020F0502020204030204" pitchFamily="34" charset="0"/>
+                        </a:rPr>
+                        <a:t>number of clusters with intensity data</a:t>
+                      </a:r>
+                    </a:p>
+                  </a:txBody>
+                  <a:tcPr marL="13187" marR="13187" marT="13187" marB="0" anchor="ctr">
+                    <a:lnL>
+                      <a:noFill/>
+                    </a:lnL>
+                    <a:lnR>
+                      <a:noFill/>
+                    </a:lnR>
+                    <a:lnT>
+                      <a:noFill/>
+                    </a:lnT>
+                    <a:lnB w="6350" cap="flat" cmpd="sng" algn="ctr">
+                      <a:solidFill>
+                        <a:srgbClr val="000000"/>
+                      </a:solidFill>
+                      <a:prstDash val="solid"/>
+                      <a:round/>
+                      <a:headEnd type="none" w="med" len="med"/>
+                      <a:tailEnd type="none" w="med" len="med"/>
+                    </a:lnB>
+                  </a:tcPr>
+                </a:tc>
+                <a:tc vMerge="1">
+                  <a:txBody>
+                    <a:bodyPr/>
+                    <a:lstStyle/>
+                    <a:p>
+                      <a:pPr algn="ctr" fontAlgn="ctr"/>
+                      <a:r>
+                        <a:rPr lang="en-US" sz="1700" b="1" i="0" u="none" strike="noStrike" dirty="0">
+                          <a:solidFill>
+                            <a:srgbClr val="000000"/>
+                          </a:solidFill>
+                          <a:effectLst/>
+                          <a:latin typeface="Calibri" panose="020F0502020204030204" pitchFamily="34" charset="0"/>
+                        </a:rPr>
+                        <a:t>number of daughter cell pairs</a:t>
+                      </a:r>
+                    </a:p>
+                  </a:txBody>
+                  <a:tcPr marL="13187" marR="13187" marT="13187" marB="0" anchor="ctr">
+                    <a:lnL>
+                      <a:noFill/>
+                    </a:lnL>
+                    <a:lnR>
+                      <a:noFill/>
+                    </a:lnR>
+                    <a:lnT>
+                      <a:noFill/>
+                    </a:lnT>
+                    <a:lnB w="6350" cap="flat" cmpd="sng" algn="ctr">
+                      <a:solidFill>
+                        <a:srgbClr val="000000"/>
+                      </a:solidFill>
+                      <a:prstDash val="solid"/>
+                      <a:round/>
+                      <a:headEnd type="none" w="med" len="med"/>
+                      <a:tailEnd type="none" w="med" len="med"/>
+                    </a:lnB>
+                  </a:tcPr>
+                </a:tc>
+                <a:tc vMerge="1">
+                  <a:txBody>
+                    <a:bodyPr/>
+                    <a:lstStyle/>
+                    <a:p>
+                      <a:pPr algn="ctr" fontAlgn="ctr"/>
+                      <a:r>
+                        <a:rPr lang="en-US" sz="1700" b="1" i="0" u="none" strike="noStrike" dirty="0">
+                          <a:solidFill>
+                            <a:srgbClr val="000000"/>
+                          </a:solidFill>
+                          <a:effectLst/>
+                          <a:latin typeface="Calibri" panose="020F0502020204030204" pitchFamily="34" charset="0"/>
+                        </a:rPr>
+                        <a:t>number of non-dividing cells </a:t>
+                      </a:r>
+                    </a:p>
+                  </a:txBody>
+                  <a:tcPr marL="13187" marR="13187" marT="13187" marB="0" anchor="ctr">
+                    <a:lnL>
+                      <a:noFill/>
+                    </a:lnL>
+                    <a:lnR>
+                      <a:noFill/>
+                    </a:lnR>
+                    <a:lnT>
+                      <a:noFill/>
+                    </a:lnT>
+                    <a:lnB w="6350" cap="flat" cmpd="sng" algn="ctr">
+                      <a:solidFill>
+                        <a:srgbClr val="000000"/>
+                      </a:solidFill>
+                      <a:prstDash val="solid"/>
+                      <a:round/>
+                      <a:headEnd type="none" w="med" len="med"/>
+                      <a:tailEnd type="none" w="med" len="med"/>
+                    </a:lnB>
+                  </a:tcPr>
+                </a:tc>
+                <a:tc>
+                  <a:txBody>
+                    <a:bodyPr/>
+                    <a:lstStyle/>
+                    <a:p>
+                      <a:pPr algn="ctr" fontAlgn="ctr"/>
+                      <a:r>
+                        <a:rPr lang="en-US" sz="1700" b="1" i="0" u="none" strike="noStrike" dirty="0">
+                          <a:solidFill>
+                            <a:srgbClr val="000000"/>
+                          </a:solidFill>
+                          <a:effectLst/>
+                          <a:latin typeface="Calibri" panose="020F0502020204030204" pitchFamily="34" charset="0"/>
+                        </a:rPr>
+                        <a:t>mean</a:t>
+                      </a:r>
+                    </a:p>
+                  </a:txBody>
+                  <a:tcPr marL="13187" marR="13187" marT="13187" marB="0" anchor="ctr">
+                    <a:lnL>
+                      <a:noFill/>
+                    </a:lnL>
+                    <a:lnR>
+                      <a:noFill/>
+                    </a:lnR>
+                    <a:lnT w="6350" cap="flat" cmpd="sng" algn="ctr">
+                      <a:solidFill>
+                        <a:srgbClr val="000000"/>
+                      </a:solidFill>
+                      <a:prstDash val="solid"/>
+                      <a:round/>
+                      <a:headEnd type="none" w="med" len="med"/>
+                      <a:tailEnd type="none" w="med" len="med"/>
+                    </a:lnT>
+                    <a:lnB w="6350" cap="flat" cmpd="sng" algn="ctr">
+                      <a:solidFill>
+                        <a:srgbClr val="000000"/>
+                      </a:solidFill>
+                      <a:prstDash val="solid"/>
+                      <a:round/>
+                      <a:headEnd type="none" w="med" len="med"/>
+                      <a:tailEnd type="none" w="med" len="med"/>
+                    </a:lnB>
+                  </a:tcPr>
+                </a:tc>
+                <a:tc>
+                  <a:txBody>
+                    <a:bodyPr/>
+                    <a:lstStyle/>
+                    <a:p>
+                      <a:pPr algn="ctr" fontAlgn="ctr"/>
+                      <a:r>
+                        <a:rPr lang="en-US" sz="1700" b="1" i="0" u="none" strike="noStrike" dirty="0">
+                          <a:solidFill>
+                            <a:srgbClr val="000000"/>
+                          </a:solidFill>
+                          <a:effectLst/>
+                          <a:latin typeface="Calibri" panose="020F0502020204030204" pitchFamily="34" charset="0"/>
+                        </a:rPr>
+                        <a:t>standard deviation</a:t>
+                      </a:r>
+                    </a:p>
+                  </a:txBody>
+                  <a:tcPr marL="13187" marR="13187" marT="13187" marB="0" anchor="ctr">
+                    <a:lnL>
+                      <a:noFill/>
+                    </a:lnL>
+                    <a:lnR>
+                      <a:noFill/>
+                    </a:lnR>
+                    <a:lnT w="6350" cap="flat" cmpd="sng" algn="ctr">
+                      <a:solidFill>
+                        <a:srgbClr val="000000"/>
+                      </a:solidFill>
+                      <a:prstDash val="solid"/>
+                      <a:round/>
+                      <a:headEnd type="none" w="med" len="med"/>
+                      <a:tailEnd type="none" w="med" len="med"/>
+                    </a:lnT>
+                    <a:lnB w="6350" cap="flat" cmpd="sng" algn="ctr">
+                      <a:solidFill>
+                        <a:srgbClr val="000000"/>
+                      </a:solidFill>
+                      <a:prstDash val="solid"/>
+                      <a:round/>
+                      <a:headEnd type="none" w="med" len="med"/>
+                      <a:tailEnd type="none" w="med" len="med"/>
+                    </a:lnB>
+                  </a:tcPr>
+                </a:tc>
+                <a:tc>
+                  <a:txBody>
+                    <a:bodyPr/>
+                    <a:lstStyle/>
+                    <a:p>
+                      <a:pPr algn="ctr" fontAlgn="ctr"/>
+                      <a:r>
+                        <a:rPr lang="en-US" sz="1700" b="1" i="0" u="none" strike="noStrike" dirty="0">
+                          <a:solidFill>
+                            <a:srgbClr val="000000"/>
+                          </a:solidFill>
+                          <a:effectLst/>
+                          <a:latin typeface="Calibri" panose="020F0502020204030204" pitchFamily="34" charset="0"/>
+                        </a:rPr>
+                        <a:t>variance</a:t>
+                      </a:r>
+                    </a:p>
+                  </a:txBody>
+                  <a:tcPr marL="13187" marR="13187" marT="13187" marB="0" anchor="ctr">
+                    <a:lnL>
+                      <a:noFill/>
+                    </a:lnL>
+                    <a:lnR>
+                      <a:noFill/>
+                    </a:lnR>
+                    <a:lnT w="6350" cap="flat" cmpd="sng" algn="ctr">
+                      <a:solidFill>
+                        <a:srgbClr val="000000"/>
+                      </a:solidFill>
+                      <a:prstDash val="solid"/>
+                      <a:round/>
+                      <a:headEnd type="none" w="med" len="med"/>
+                      <a:tailEnd type="none" w="med" len="med"/>
+                    </a:lnT>
+                    <a:lnB w="6350" cap="flat" cmpd="sng" algn="ctr">
+                      <a:solidFill>
+                        <a:srgbClr val="000000"/>
+                      </a:solidFill>
+                      <a:prstDash val="solid"/>
+                      <a:round/>
+                      <a:headEnd type="none" w="med" len="med"/>
+                      <a:tailEnd type="none" w="med" len="med"/>
+                    </a:lnB>
+                  </a:tcPr>
+                </a:tc>
+                <a:tc>
+                  <a:txBody>
+                    <a:bodyPr/>
+                    <a:lstStyle/>
+                    <a:p>
+                      <a:pPr algn="ctr" fontAlgn="ctr"/>
+                      <a:r>
+                        <a:rPr lang="en-US" sz="1700" b="1" i="0" u="none" strike="noStrike" dirty="0">
+                          <a:solidFill>
+                            <a:srgbClr val="000000"/>
+                          </a:solidFill>
+                          <a:effectLst/>
+                          <a:latin typeface="Calibri" panose="020F0502020204030204" pitchFamily="34" charset="0"/>
+                        </a:rPr>
+                        <a:t> </a:t>
+                      </a:r>
+                    </a:p>
+                  </a:txBody>
+                  <a:tcPr marL="13187" marR="13187" marT="13187" marB="0" anchor="ctr">
+                    <a:lnL>
+                      <a:noFill/>
+                    </a:lnL>
+                    <a:lnR>
+                      <a:noFill/>
+                    </a:lnR>
+                    <a:lnT>
+                      <a:noFill/>
+                    </a:lnT>
+                    <a:lnB w="6350" cap="flat" cmpd="sng" algn="ctr">
+                      <a:solidFill>
+                        <a:srgbClr val="000000"/>
+                      </a:solidFill>
+                      <a:prstDash val="solid"/>
+                      <a:round/>
+                      <a:headEnd type="none" w="med" len="med"/>
+                      <a:tailEnd type="none" w="med" len="med"/>
+                    </a:lnB>
+                  </a:tcPr>
+                </a:tc>
+                <a:tc>
+                  <a:txBody>
+                    <a:bodyPr/>
+                    <a:lstStyle/>
+                    <a:p>
+                      <a:pPr algn="ctr" fontAlgn="ctr"/>
+                      <a:r>
+                        <a:rPr lang="en-US" sz="1700" b="1" i="0" u="none" strike="noStrike" dirty="0">
+                          <a:solidFill>
+                            <a:srgbClr val="000000"/>
+                          </a:solidFill>
+                          <a:effectLst/>
+                          <a:latin typeface="Calibri" panose="020F0502020204030204" pitchFamily="34" charset="0"/>
+                        </a:rPr>
+                        <a:t>replication efficiency (%)</a:t>
+                      </a:r>
+                    </a:p>
+                  </a:txBody>
+                  <a:tcPr marL="13187" marR="13187" marT="13187" marB="0" anchor="ctr">
+                    <a:lnL>
+                      <a:noFill/>
+                    </a:lnL>
+                    <a:lnR>
+                      <a:noFill/>
+                    </a:lnR>
+                    <a:lnT w="6350" cap="flat" cmpd="sng" algn="ctr">
+                      <a:solidFill>
+                        <a:srgbClr val="000000"/>
+                      </a:solidFill>
+                      <a:prstDash val="solid"/>
+                      <a:round/>
+                      <a:headEnd type="none" w="med" len="med"/>
+                      <a:tailEnd type="none" w="med" len="med"/>
+                    </a:lnT>
+                    <a:lnB w="6350" cap="flat" cmpd="sng" algn="ctr">
+                      <a:solidFill>
+                        <a:srgbClr val="000000"/>
+                      </a:solidFill>
+                      <a:prstDash val="solid"/>
+                      <a:round/>
+                      <a:headEnd type="none" w="med" len="med"/>
+                      <a:tailEnd type="none" w="med" len="med"/>
+                    </a:lnB>
+                  </a:tcPr>
+                </a:tc>
+                <a:tc>
+                  <a:txBody>
+                    <a:bodyPr/>
+                    <a:lstStyle/>
+                    <a:p>
+                      <a:pPr algn="ctr" fontAlgn="ctr"/>
+                      <a:r>
+                        <a:rPr lang="en-US" sz="1700" b="1" i="0" u="none" strike="noStrike" dirty="0">
+                          <a:solidFill>
+                            <a:srgbClr val="000000"/>
+                          </a:solidFill>
+                          <a:effectLst/>
+                          <a:latin typeface="Calibri" panose="020F0502020204030204" pitchFamily="34" charset="0"/>
+                        </a:rPr>
+                        <a:t>segregation efficiency (%)</a:t>
+                      </a:r>
+                    </a:p>
+                  </a:txBody>
+                  <a:tcPr marL="13187" marR="13187" marT="13187" marB="0" anchor="ctr">
+                    <a:lnL>
+                      <a:noFill/>
+                    </a:lnL>
+                    <a:lnR>
+                      <a:noFill/>
+                    </a:lnR>
+                    <a:lnT w="6350" cap="flat" cmpd="sng" algn="ctr">
+                      <a:solidFill>
+                        <a:srgbClr val="000000"/>
+                      </a:solidFill>
+                      <a:prstDash val="solid"/>
+                      <a:round/>
+                      <a:headEnd type="none" w="med" len="med"/>
+                      <a:tailEnd type="none" w="med" len="med"/>
+                    </a:lnT>
+                    <a:lnB w="6350" cap="flat" cmpd="sng" algn="ctr">
+                      <a:solidFill>
+                        <a:srgbClr val="000000"/>
+                      </a:solidFill>
+                      <a:prstDash val="solid"/>
+                      <a:round/>
+                      <a:headEnd type="none" w="med" len="med"/>
+                      <a:tailEnd type="none" w="med" len="med"/>
+                    </a:lnB>
+                  </a:tcPr>
+                </a:tc>
+                <a:tc vMerge="1">
+                  <a:txBody>
+                    <a:bodyPr/>
+                    <a:lstStyle/>
+                    <a:p>
+                      <a:pPr marL="0" marR="0" lvl="0" indent="0" algn="ctr" defTabSz="914400" rtl="0" eaLnBrk="1" fontAlgn="ctr" latinLnBrk="0" hangingPunct="1">
+                        <a:lnSpc>
+                          <a:spcPct val="100000"/>
+                        </a:lnSpc>
+                        <a:spcBef>
+                          <a:spcPts val="0"/>
+                        </a:spcBef>
+                        <a:spcAft>
+                          <a:spcPts val="0"/>
+                        </a:spcAft>
+                        <a:buClrTx/>
+                        <a:buSzTx/>
+                        <a:buFontTx/>
+                        <a:buNone/>
+                        <a:tabLst/>
+                        <a:defRPr/>
+                      </a:pPr>
+                      <a:r>
+                        <a:rPr lang="en-US" sz="1700" b="1" i="0" u="none" strike="noStrike" dirty="0">
+                          <a:solidFill>
+                            <a:srgbClr val="000000"/>
+                          </a:solidFill>
+                          <a:effectLst/>
+                          <a:latin typeface="Calibri" panose="020F0502020204030204" pitchFamily="34" charset="0"/>
+                        </a:rPr>
+                        <a:t>X0 Lambda</a:t>
+                      </a:r>
+                    </a:p>
+                    <a:p>
+                      <a:pPr algn="ctr" fontAlgn="ctr"/>
+                      <a:endParaRPr lang="en-US" sz="1700" b="1" i="0" u="none" strike="noStrike" dirty="0">
+                        <a:solidFill>
+                          <a:srgbClr val="000000"/>
+                        </a:solidFill>
+                        <a:effectLst/>
+                        <a:latin typeface="Calibri" panose="020F0502020204030204" pitchFamily="34" charset="0"/>
+                      </a:endParaRPr>
+                    </a:p>
+                  </a:txBody>
+                  <a:tcPr marL="13187" marR="13187" marT="13187" marB="0" anchor="ctr">
+                    <a:lnL>
+                      <a:noFill/>
+                    </a:lnL>
+                    <a:lnR>
+                      <a:noFill/>
+                    </a:lnR>
+                    <a:lnT w="6350" cap="flat" cmpd="sng" algn="ctr">
+                      <a:solidFill>
+                        <a:srgbClr val="000000"/>
+                      </a:solidFill>
+                      <a:prstDash val="solid"/>
+                      <a:round/>
+                      <a:headEnd type="none" w="med" len="med"/>
+                      <a:tailEnd type="none" w="med" len="med"/>
+                    </a:lnT>
+                    <a:lnB w="6350" cap="flat" cmpd="sng" algn="ctr">
+                      <a:solidFill>
+                        <a:srgbClr val="000000"/>
+                      </a:solidFill>
+                      <a:prstDash val="solid"/>
+                      <a:round/>
+                      <a:headEnd type="none" w="med" len="med"/>
+                      <a:tailEnd type="none" w="med" len="med"/>
+                    </a:lnB>
+                  </a:tcPr>
+                </a:tc>
+                <a:extLst>
+                  <a:ext uri="{0D108BD9-81ED-4DB2-BD59-A6C34878D82A}">
+                    <a16:rowId xmlns:a16="http://schemas.microsoft.com/office/drawing/2014/main" val="4035571152"/>
+                  </a:ext>
+                </a:extLst>
+              </a:tr>
+              <a:tr h="266870">
+                <a:tc>
+                  <a:txBody>
+                    <a:bodyPr/>
+                    <a:lstStyle/>
+                    <a:p>
+                      <a:pPr algn="l" fontAlgn="b"/>
+                      <a:r>
+                        <a:rPr lang="en-US" sz="1700" b="0" i="0" u="none" strike="noStrike">
+                          <a:solidFill>
+                            <a:srgbClr val="000000"/>
+                          </a:solidFill>
+                          <a:effectLst/>
+                          <a:latin typeface="Calibri" panose="020F0502020204030204" pitchFamily="34" charset="0"/>
+                        </a:rPr>
+                        <a:t>fixed 8TR</a:t>
+                      </a:r>
+                    </a:p>
+                  </a:txBody>
+                  <a:tcPr marL="13187" marR="13187" marT="13187" marB="0" anchor="b">
+                    <a:lnL>
+                      <a:noFill/>
+                    </a:lnL>
+                    <a:lnR>
+                      <a:noFill/>
+                    </a:lnR>
+                    <a:lnT w="6350" cap="flat" cmpd="sng" algn="ctr">
+                      <a:solidFill>
+                        <a:srgbClr val="000000"/>
+                      </a:solidFill>
+                      <a:prstDash val="solid"/>
+                      <a:round/>
+                      <a:headEnd type="none" w="med" len="med"/>
+                      <a:tailEnd type="none" w="med" len="med"/>
+                    </a:lnT>
+                    <a:lnB>
+                      <a:noFill/>
+                    </a:lnB>
+                    <a:solidFill>
+                      <a:srgbClr val="D0CECE"/>
+                    </a:solidFill>
+                  </a:tcPr>
+                </a:tc>
+                <a:tc>
+                  <a:txBody>
+                    <a:bodyPr/>
+                    <a:lstStyle/>
+                    <a:p>
+                      <a:pPr algn="r" fontAlgn="b"/>
+                      <a:r>
+                        <a:rPr lang="en-US" sz="1700" b="0" i="0" u="none" strike="noStrike" dirty="0">
+                          <a:solidFill>
+                            <a:srgbClr val="000000"/>
+                          </a:solidFill>
+                          <a:effectLst/>
+                          <a:latin typeface="Calibri" panose="020F0502020204030204" pitchFamily="34" charset="0"/>
+                        </a:rPr>
+                        <a:t>230</a:t>
+                      </a:r>
+                    </a:p>
+                  </a:txBody>
+                  <a:tcPr marL="13187" marR="13187" marT="13187" marB="0" anchor="b">
+                    <a:lnL>
+                      <a:noFill/>
+                    </a:lnL>
+                    <a:lnR>
+                      <a:noFill/>
+                    </a:lnR>
+                    <a:lnT w="6350" cap="flat" cmpd="sng" algn="ctr">
+                      <a:solidFill>
+                        <a:srgbClr val="000000"/>
+                      </a:solidFill>
+                      <a:prstDash val="solid"/>
+                      <a:round/>
+                      <a:headEnd type="none" w="med" len="med"/>
+                      <a:tailEnd type="none" w="med" len="med"/>
+                    </a:lnT>
+                    <a:lnB>
+                      <a:noFill/>
+                    </a:lnB>
+                    <a:solidFill>
+                      <a:srgbClr val="D0CECE"/>
+                    </a:solidFill>
+                  </a:tcPr>
+                </a:tc>
+                <a:tc>
+                  <a:txBody>
+                    <a:bodyPr/>
+                    <a:lstStyle/>
+                    <a:p>
+                      <a:pPr algn="r" fontAlgn="b"/>
+                      <a:r>
+                        <a:rPr lang="en-US" sz="1700" b="0" i="0" u="none" strike="noStrike" dirty="0">
+                          <a:solidFill>
+                            <a:srgbClr val="000000"/>
+                          </a:solidFill>
+                          <a:effectLst/>
+                          <a:latin typeface="Calibri" panose="020F0502020204030204" pitchFamily="34" charset="0"/>
+                        </a:rPr>
+                        <a:t>40</a:t>
+                      </a:r>
+                    </a:p>
+                  </a:txBody>
+                  <a:tcPr marL="13187" marR="13187" marT="13187" marB="0" anchor="b">
+                    <a:lnL>
+                      <a:noFill/>
+                    </a:lnL>
+                    <a:lnR>
+                      <a:noFill/>
+                    </a:lnR>
+                    <a:lnT w="6350" cap="flat" cmpd="sng" algn="ctr">
+                      <a:solidFill>
+                        <a:srgbClr val="000000"/>
+                      </a:solidFill>
+                      <a:prstDash val="solid"/>
+                      <a:round/>
+                      <a:headEnd type="none" w="med" len="med"/>
+                      <a:tailEnd type="none" w="med" len="med"/>
+                    </a:lnT>
+                    <a:lnB>
+                      <a:noFill/>
+                    </a:lnB>
+                    <a:solidFill>
+                      <a:srgbClr val="D0CECE"/>
+                    </a:solidFill>
+                  </a:tcPr>
+                </a:tc>
+                <a:tc>
+                  <a:txBody>
+                    <a:bodyPr/>
+                    <a:lstStyle/>
+                    <a:p>
+                      <a:pPr algn="r" fontAlgn="b"/>
+                      <a:r>
+                        <a:rPr lang="en-US" sz="1700" b="0" i="0" u="none" strike="noStrike" dirty="0">
+                          <a:solidFill>
+                            <a:srgbClr val="000000"/>
+                          </a:solidFill>
+                          <a:effectLst/>
+                          <a:latin typeface="Calibri" panose="020F0502020204030204" pitchFamily="34" charset="0"/>
+                        </a:rPr>
+                        <a:t>41</a:t>
+                      </a:r>
+                    </a:p>
+                  </a:txBody>
+                  <a:tcPr marL="13187" marR="13187" marT="13187" marB="0" anchor="b">
+                    <a:lnL>
+                      <a:noFill/>
+                    </a:lnL>
+                    <a:lnR>
+                      <a:noFill/>
+                    </a:lnR>
+                    <a:lnT w="6350" cap="flat" cmpd="sng" algn="ctr">
+                      <a:solidFill>
+                        <a:srgbClr val="000000"/>
+                      </a:solidFill>
+                      <a:prstDash val="solid"/>
+                      <a:round/>
+                      <a:headEnd type="none" w="med" len="med"/>
+                      <a:tailEnd type="none" w="med" len="med"/>
+                    </a:lnT>
+                    <a:lnB>
+                      <a:noFill/>
+                    </a:lnB>
+                    <a:solidFill>
+                      <a:srgbClr val="D0CECE"/>
+                    </a:solidFill>
+                  </a:tcPr>
+                </a:tc>
+                <a:tc>
+                  <a:txBody>
+                    <a:bodyPr/>
+                    <a:lstStyle/>
+                    <a:p>
+                      <a:pPr algn="r" fontAlgn="b"/>
+                      <a:r>
+                        <a:rPr lang="en-US" sz="1600" dirty="0"/>
+                        <a:t>739.93</a:t>
+                      </a:r>
+                      <a:endParaRPr lang="en-US" sz="1700" b="0" i="0" u="none" strike="noStrike" dirty="0">
+                        <a:solidFill>
+                          <a:srgbClr val="000000"/>
+                        </a:solidFill>
+                        <a:effectLst/>
+                        <a:latin typeface="Calibri" panose="020F0502020204030204" pitchFamily="34" charset="0"/>
+                      </a:endParaRPr>
+                    </a:p>
+                  </a:txBody>
+                  <a:tcPr marL="13187" marR="13187" marT="13187" marB="0" anchor="b">
+                    <a:lnL>
+                      <a:noFill/>
+                    </a:lnL>
+                    <a:lnR>
+                      <a:noFill/>
+                    </a:lnR>
+                    <a:lnT w="6350" cap="flat" cmpd="sng" algn="ctr">
+                      <a:solidFill>
+                        <a:srgbClr val="000000"/>
+                      </a:solidFill>
+                      <a:prstDash val="solid"/>
+                      <a:round/>
+                      <a:headEnd type="none" w="med" len="med"/>
+                      <a:tailEnd type="none" w="med" len="med"/>
+                    </a:lnT>
+                    <a:lnB>
+                      <a:noFill/>
+                    </a:lnB>
+                    <a:solidFill>
+                      <a:srgbClr val="D0CECE"/>
+                    </a:solidFill>
+                  </a:tcPr>
+                </a:tc>
+                <a:tc>
+                  <a:txBody>
+                    <a:bodyPr/>
+                    <a:lstStyle/>
+                    <a:p>
+                      <a:pPr algn="r" fontAlgn="b"/>
+                      <a:r>
+                        <a:rPr lang="en-US" sz="1600" dirty="0"/>
+                        <a:t>349.36</a:t>
+                      </a:r>
+                      <a:endParaRPr lang="en-US" sz="1700" b="0" i="0" u="none" strike="noStrike" dirty="0">
+                        <a:solidFill>
+                          <a:srgbClr val="000000"/>
+                        </a:solidFill>
+                        <a:effectLst/>
+                        <a:latin typeface="Calibri" panose="020F0502020204030204" pitchFamily="34" charset="0"/>
+                      </a:endParaRPr>
+                    </a:p>
+                  </a:txBody>
+                  <a:tcPr marL="13187" marR="13187" marT="13187" marB="0" anchor="b">
+                    <a:lnL>
+                      <a:noFill/>
+                    </a:lnL>
+                    <a:lnR>
+                      <a:noFill/>
+                    </a:lnR>
+                    <a:lnT w="6350" cap="flat" cmpd="sng" algn="ctr">
+                      <a:solidFill>
+                        <a:srgbClr val="000000"/>
+                      </a:solidFill>
+                      <a:prstDash val="solid"/>
+                      <a:round/>
+                      <a:headEnd type="none" w="med" len="med"/>
+                      <a:tailEnd type="none" w="med" len="med"/>
+                    </a:lnT>
+                    <a:lnB>
+                      <a:noFill/>
+                    </a:lnB>
+                    <a:solidFill>
+                      <a:srgbClr val="D0CECE"/>
+                    </a:solidFill>
+                  </a:tcPr>
+                </a:tc>
+                <a:tc>
+                  <a:txBody>
+                    <a:bodyPr/>
+                    <a:lstStyle/>
+                    <a:p>
+                      <a:pPr algn="r" fontAlgn="b"/>
+                      <a:r>
+                        <a:rPr lang="en-US" sz="1600" dirty="0"/>
+                        <a:t>122055.3</a:t>
+                      </a:r>
+                      <a:endParaRPr lang="en-US" sz="1700" b="0" i="0" u="none" strike="noStrike" dirty="0">
+                        <a:solidFill>
+                          <a:srgbClr val="000000"/>
+                        </a:solidFill>
+                        <a:effectLst/>
+                        <a:latin typeface="Calibri" panose="020F0502020204030204" pitchFamily="34" charset="0"/>
+                      </a:endParaRPr>
+                    </a:p>
+                  </a:txBody>
+                  <a:tcPr marL="13187" marR="13187" marT="13187" marB="0" anchor="b">
+                    <a:lnL>
+                      <a:noFill/>
+                    </a:lnL>
+                    <a:lnR>
+                      <a:noFill/>
+                    </a:lnR>
+                    <a:lnT w="6350" cap="flat" cmpd="sng" algn="ctr">
+                      <a:solidFill>
+                        <a:srgbClr val="000000"/>
+                      </a:solidFill>
+                      <a:prstDash val="solid"/>
+                      <a:round/>
+                      <a:headEnd type="none" w="med" len="med"/>
+                      <a:tailEnd type="none" w="med" len="med"/>
+                    </a:lnT>
+                    <a:lnB>
+                      <a:noFill/>
+                    </a:lnB>
+                    <a:solidFill>
+                      <a:srgbClr val="D0CECE"/>
+                    </a:solidFill>
+                  </a:tcPr>
+                </a:tc>
+                <a:tc>
+                  <a:txBody>
+                    <a:bodyPr/>
+                    <a:lstStyle/>
+                    <a:p>
+                      <a:pPr algn="l" fontAlgn="b"/>
+                      <a:endParaRPr lang="en-US" sz="1700" b="0" i="0" u="none" strike="noStrike" dirty="0">
+                        <a:solidFill>
+                          <a:srgbClr val="000000"/>
+                        </a:solidFill>
+                        <a:effectLst/>
+                        <a:latin typeface="Calibri" panose="020F0502020204030204" pitchFamily="34" charset="0"/>
+                      </a:endParaRPr>
+                    </a:p>
+                  </a:txBody>
+                  <a:tcPr marL="13187" marR="13187" marT="13187" marB="0" anchor="b">
+                    <a:lnL>
+                      <a:noFill/>
+                    </a:lnL>
+                    <a:lnR>
+                      <a:noFill/>
+                    </a:lnR>
+                    <a:lnT w="6350" cap="flat" cmpd="sng" algn="ctr">
+                      <a:solidFill>
+                        <a:srgbClr val="000000"/>
+                      </a:solidFill>
+                      <a:prstDash val="solid"/>
+                      <a:round/>
+                      <a:headEnd type="none" w="med" len="med"/>
+                      <a:tailEnd type="none" w="med" len="med"/>
+                    </a:lnT>
+                    <a:lnB>
+                      <a:noFill/>
+                    </a:lnB>
+                    <a:solidFill>
+                      <a:srgbClr val="D0CECE"/>
+                    </a:solidFill>
+                  </a:tcPr>
+                </a:tc>
+                <a:tc>
+                  <a:txBody>
+                    <a:bodyPr/>
+                    <a:lstStyle/>
+                    <a:p>
+                      <a:pPr marL="0" marR="0" algn="r">
+                        <a:lnSpc>
+                          <a:spcPct val="200000"/>
+                        </a:lnSpc>
+                        <a:spcBef>
+                          <a:spcPts val="0"/>
+                        </a:spcBef>
+                        <a:spcAft>
+                          <a:spcPts val="0"/>
+                        </a:spcAft>
+                      </a:pPr>
+                      <a:r>
+                        <a:rPr lang="en-US" sz="1600" i="0" dirty="0">
+                          <a:solidFill>
+                            <a:srgbClr val="000000"/>
+                          </a:solidFill>
+                          <a:effectLst/>
+                          <a:latin typeface="Calibri" panose="020F0502020204030204" pitchFamily="34" charset="0"/>
+                          <a:ea typeface="Times New Roman" panose="02020603050405020304" pitchFamily="18" charset="0"/>
+                          <a:cs typeface="Calibri" panose="020F0502020204030204" pitchFamily="34" charset="0"/>
+                        </a:rPr>
+                        <a:t>75 [50-91]</a:t>
+                      </a:r>
+                      <a:endParaRPr lang="en-US" sz="1600" i="0" dirty="0">
+                        <a:effectLst/>
+                        <a:latin typeface="Calibri" panose="020F0502020204030204" pitchFamily="34" charset="0"/>
+                        <a:ea typeface="Times New Roman" panose="02020603050405020304" pitchFamily="18" charset="0"/>
+                        <a:cs typeface="Calibri" panose="020F0502020204030204" pitchFamily="34" charset="0"/>
+                      </a:endParaRPr>
+                    </a:p>
+                  </a:txBody>
+                  <a:tcPr marL="68580" marR="68580" marT="0" marB="0">
+                    <a:lnL>
+                      <a:noFill/>
+                    </a:lnL>
+                    <a:lnR>
+                      <a:noFill/>
+                    </a:lnR>
+                    <a:lnT w="6350" cap="flat" cmpd="sng" algn="ctr">
+                      <a:solidFill>
+                        <a:srgbClr val="000000"/>
+                      </a:solidFill>
+                      <a:prstDash val="solid"/>
+                      <a:round/>
+                      <a:headEnd type="none" w="med" len="med"/>
+                      <a:tailEnd type="none" w="med" len="med"/>
+                    </a:lnT>
+                    <a:lnB>
+                      <a:noFill/>
+                    </a:lnB>
+                    <a:solidFill>
+                      <a:srgbClr val="D0CECE"/>
+                    </a:solidFill>
+                  </a:tcPr>
+                </a:tc>
+                <a:tc>
+                  <a:txBody>
+                    <a:bodyPr/>
+                    <a:lstStyle/>
+                    <a:p>
+                      <a:pPr marL="0" marR="0" algn="r">
+                        <a:lnSpc>
+                          <a:spcPct val="200000"/>
+                        </a:lnSpc>
+                        <a:spcBef>
+                          <a:spcPts val="0"/>
+                        </a:spcBef>
+                        <a:spcAft>
+                          <a:spcPts val="0"/>
+                        </a:spcAft>
+                      </a:pPr>
+                      <a:r>
+                        <a:rPr lang="en-US" sz="1600" i="0" dirty="0">
+                          <a:solidFill>
+                            <a:srgbClr val="000000"/>
+                          </a:solidFill>
+                          <a:effectLst/>
+                          <a:latin typeface="Calibri" panose="020F0502020204030204" pitchFamily="34" charset="0"/>
+                          <a:ea typeface="Times New Roman" panose="02020603050405020304" pitchFamily="18" charset="0"/>
+                          <a:cs typeface="Calibri" panose="020F0502020204030204" pitchFamily="34" charset="0"/>
+                        </a:rPr>
+                        <a:t>87 [64-100]</a:t>
+                      </a:r>
+                      <a:endParaRPr lang="en-US" sz="1600" i="0" dirty="0">
+                        <a:effectLst/>
+                        <a:latin typeface="Calibri" panose="020F0502020204030204" pitchFamily="34" charset="0"/>
+                        <a:ea typeface="Times New Roman" panose="02020603050405020304" pitchFamily="18" charset="0"/>
+                        <a:cs typeface="Calibri" panose="020F0502020204030204" pitchFamily="34" charset="0"/>
+                      </a:endParaRPr>
+                    </a:p>
+                  </a:txBody>
+                  <a:tcPr marL="68580" marR="68580" marT="0" marB="0">
+                    <a:lnL>
+                      <a:noFill/>
+                    </a:lnL>
+                    <a:lnR>
+                      <a:noFill/>
+                    </a:lnR>
+                    <a:lnT w="6350" cap="flat" cmpd="sng" algn="ctr">
+                      <a:solidFill>
+                        <a:srgbClr val="000000"/>
+                      </a:solidFill>
+                      <a:prstDash val="solid"/>
+                      <a:round/>
+                      <a:headEnd type="none" w="med" len="med"/>
+                      <a:tailEnd type="none" w="med" len="med"/>
+                    </a:lnT>
+                    <a:lnB>
+                      <a:noFill/>
+                    </a:lnB>
+                    <a:solidFill>
+                      <a:srgbClr val="D0CECE"/>
+                    </a:solidFill>
+                  </a:tcPr>
+                </a:tc>
+                <a:tc>
+                  <a:txBody>
+                    <a:bodyPr/>
+                    <a:lstStyle/>
+                    <a:p>
+                      <a:pPr marL="0" marR="0" algn="r">
+                        <a:lnSpc>
+                          <a:spcPct val="200000"/>
+                        </a:lnSpc>
+                        <a:spcBef>
+                          <a:spcPts val="0"/>
+                        </a:spcBef>
+                        <a:spcAft>
+                          <a:spcPts val="0"/>
+                        </a:spcAft>
+                      </a:pPr>
+                      <a:r>
+                        <a:rPr lang="en-US" sz="1600" i="0" dirty="0">
+                          <a:effectLst/>
+                          <a:latin typeface="Calibri" panose="020F0502020204030204" pitchFamily="34" charset="0"/>
+                          <a:ea typeface="Times New Roman" panose="02020603050405020304" pitchFamily="18" charset="0"/>
+                          <a:cs typeface="Calibri" panose="020F0502020204030204" pitchFamily="34" charset="0"/>
+                        </a:rPr>
+                        <a:t>3.06</a:t>
+                      </a:r>
+                    </a:p>
+                  </a:txBody>
+                  <a:tcPr marL="68580" marR="68580" marT="0" marB="0">
+                    <a:lnL>
+                      <a:noFill/>
+                    </a:lnL>
+                    <a:lnR>
+                      <a:noFill/>
+                    </a:lnR>
+                    <a:lnT w="6350" cap="flat" cmpd="sng" algn="ctr">
+                      <a:solidFill>
+                        <a:srgbClr val="000000"/>
+                      </a:solidFill>
+                      <a:prstDash val="solid"/>
+                      <a:round/>
+                      <a:headEnd type="none" w="med" len="med"/>
+                      <a:tailEnd type="none" w="med" len="med"/>
+                    </a:lnT>
+                    <a:lnB>
+                      <a:noFill/>
+                    </a:lnB>
+                    <a:solidFill>
+                      <a:srgbClr val="D0CECE"/>
+                    </a:solidFill>
+                  </a:tcPr>
+                </a:tc>
+                <a:extLst>
+                  <a:ext uri="{0D108BD9-81ED-4DB2-BD59-A6C34878D82A}">
+                    <a16:rowId xmlns:a16="http://schemas.microsoft.com/office/drawing/2014/main" val="1092323030"/>
+                  </a:ext>
+                </a:extLst>
+              </a:tr>
+              <a:tr h="266870">
+                <a:tc>
+                  <a:txBody>
+                    <a:bodyPr/>
+                    <a:lstStyle/>
+                    <a:p>
+                      <a:pPr algn="l" fontAlgn="b"/>
+                      <a:r>
+                        <a:rPr lang="en-US" sz="1700" b="0" i="0" u="none" strike="noStrike">
+                          <a:solidFill>
+                            <a:srgbClr val="000000"/>
+                          </a:solidFill>
+                          <a:effectLst/>
+                          <a:latin typeface="Calibri" panose="020F0502020204030204" pitchFamily="34" charset="0"/>
+                        </a:rPr>
+                        <a:t>live 8TR</a:t>
+                      </a:r>
+                    </a:p>
+                  </a:txBody>
+                  <a:tcPr marL="13187" marR="13187" marT="13187" marB="0" anchor="b">
+                    <a:lnL>
+                      <a:noFill/>
+                    </a:lnL>
+                    <a:lnR>
+                      <a:noFill/>
+                    </a:lnR>
+                    <a:lnT>
+                      <a:noFill/>
+                    </a:lnT>
+                    <a:lnB>
+                      <a:noFill/>
+                    </a:lnB>
+                  </a:tcPr>
+                </a:tc>
+                <a:tc>
+                  <a:txBody>
+                    <a:bodyPr/>
+                    <a:lstStyle/>
+                    <a:p>
+                      <a:pPr algn="r" fontAlgn="b"/>
+                      <a:r>
+                        <a:rPr lang="en-US" sz="1700" b="0" i="0" u="none" strike="noStrike">
+                          <a:solidFill>
+                            <a:srgbClr val="000000"/>
+                          </a:solidFill>
+                          <a:effectLst/>
+                          <a:latin typeface="Calibri" panose="020F0502020204030204" pitchFamily="34" charset="0"/>
+                        </a:rPr>
+                        <a:t>50</a:t>
+                      </a:r>
+                    </a:p>
+                  </a:txBody>
+                  <a:tcPr marL="13187" marR="13187" marT="13187" marB="0" anchor="b">
+                    <a:lnL>
+                      <a:noFill/>
+                    </a:lnL>
+                    <a:lnR>
+                      <a:noFill/>
+                    </a:lnR>
+                    <a:lnT>
+                      <a:noFill/>
+                    </a:lnT>
+                    <a:lnB>
+                      <a:noFill/>
+                    </a:lnB>
+                  </a:tcPr>
+                </a:tc>
+                <a:tc>
+                  <a:txBody>
+                    <a:bodyPr/>
+                    <a:lstStyle/>
+                    <a:p>
+                      <a:pPr algn="r" fontAlgn="b"/>
+                      <a:r>
+                        <a:rPr lang="en-US" sz="1700" b="0" i="0" u="none" strike="noStrike" dirty="0">
+                          <a:solidFill>
+                            <a:srgbClr val="000000"/>
+                          </a:solidFill>
+                          <a:effectLst/>
+                          <a:latin typeface="Calibri" panose="020F0502020204030204" pitchFamily="34" charset="0"/>
+                        </a:rPr>
+                        <a:t>10</a:t>
+                      </a:r>
+                    </a:p>
+                  </a:txBody>
+                  <a:tcPr marL="13187" marR="13187" marT="13187" marB="0" anchor="b">
+                    <a:lnL>
+                      <a:noFill/>
+                    </a:lnL>
+                    <a:lnR>
+                      <a:noFill/>
+                    </a:lnR>
+                    <a:lnT>
+                      <a:noFill/>
+                    </a:lnT>
+                    <a:lnB>
+                      <a:noFill/>
+                    </a:lnB>
+                  </a:tcPr>
+                </a:tc>
+                <a:tc>
+                  <a:txBody>
+                    <a:bodyPr/>
+                    <a:lstStyle/>
+                    <a:p>
+                      <a:pPr algn="r" fontAlgn="b"/>
+                      <a:r>
+                        <a:rPr lang="en-US" sz="1700" b="0" i="0" u="none" strike="noStrike" dirty="0">
+                          <a:solidFill>
+                            <a:srgbClr val="000000"/>
+                          </a:solidFill>
+                          <a:effectLst/>
+                          <a:latin typeface="Calibri" panose="020F0502020204030204" pitchFamily="34" charset="0"/>
+                        </a:rPr>
+                        <a:t>13</a:t>
+                      </a:r>
+                    </a:p>
+                  </a:txBody>
+                  <a:tcPr marL="13187" marR="13187" marT="13187" marB="0" anchor="b">
+                    <a:lnL>
+                      <a:noFill/>
+                    </a:lnL>
+                    <a:lnR>
+                      <a:noFill/>
+                    </a:lnR>
+                    <a:lnT>
+                      <a:noFill/>
+                    </a:lnT>
+                    <a:lnB>
+                      <a:noFill/>
+                    </a:lnB>
+                  </a:tcPr>
+                </a:tc>
+                <a:tc>
+                  <a:txBody>
+                    <a:bodyPr/>
+                    <a:lstStyle/>
+                    <a:p>
+                      <a:pPr algn="r" fontAlgn="b"/>
+                      <a:r>
+                        <a:rPr lang="en-US" sz="1700" b="0" i="0" u="none" strike="noStrike" dirty="0">
+                          <a:solidFill>
+                            <a:srgbClr val="000000"/>
+                          </a:solidFill>
+                          <a:effectLst/>
+                          <a:latin typeface="Calibri" panose="020F0502020204030204" pitchFamily="34" charset="0"/>
+                        </a:rPr>
+                        <a:t>1165.95</a:t>
+                      </a:r>
+                    </a:p>
+                  </a:txBody>
+                  <a:tcPr marL="13187" marR="13187" marT="13187" marB="0" anchor="b">
+                    <a:lnL>
+                      <a:noFill/>
+                    </a:lnL>
+                    <a:lnR>
+                      <a:noFill/>
+                    </a:lnR>
+                    <a:lnT>
+                      <a:noFill/>
+                    </a:lnT>
+                    <a:lnB>
+                      <a:noFill/>
+                    </a:lnB>
+                  </a:tcPr>
+                </a:tc>
+                <a:tc>
+                  <a:txBody>
+                    <a:bodyPr/>
+                    <a:lstStyle/>
+                    <a:p>
+                      <a:pPr algn="r" fontAlgn="b"/>
+                      <a:r>
+                        <a:rPr lang="en-US" sz="1600" dirty="0"/>
+                        <a:t>465.84</a:t>
+                      </a:r>
+                      <a:endParaRPr lang="en-US" sz="1700" b="0" i="0" u="none" strike="noStrike" dirty="0">
+                        <a:solidFill>
+                          <a:srgbClr val="000000"/>
+                        </a:solidFill>
+                        <a:effectLst/>
+                        <a:latin typeface="Calibri" panose="020F0502020204030204" pitchFamily="34" charset="0"/>
+                      </a:endParaRPr>
+                    </a:p>
+                  </a:txBody>
+                  <a:tcPr marL="13187" marR="13187" marT="13187" marB="0" anchor="b">
+                    <a:lnL>
+                      <a:noFill/>
+                    </a:lnL>
+                    <a:lnR>
+                      <a:noFill/>
+                    </a:lnR>
+                    <a:lnT>
+                      <a:noFill/>
+                    </a:lnT>
+                    <a:lnB>
+                      <a:noFill/>
+                    </a:lnB>
+                  </a:tcPr>
+                </a:tc>
+                <a:tc>
+                  <a:txBody>
+                    <a:bodyPr/>
+                    <a:lstStyle/>
+                    <a:p>
+                      <a:pPr algn="r" fontAlgn="b"/>
+                      <a:r>
+                        <a:rPr lang="en-US" sz="1600" dirty="0"/>
+                        <a:t>217007.00 </a:t>
+                      </a:r>
+                      <a:endParaRPr lang="en-US" sz="1700" b="0" i="0" u="none" strike="noStrike" dirty="0">
+                        <a:solidFill>
+                          <a:srgbClr val="000000"/>
+                        </a:solidFill>
+                        <a:effectLst/>
+                        <a:latin typeface="Calibri" panose="020F0502020204030204" pitchFamily="34" charset="0"/>
+                      </a:endParaRPr>
+                    </a:p>
+                  </a:txBody>
+                  <a:tcPr marL="13187" marR="13187" marT="13187" marB="0" anchor="b">
+                    <a:lnL>
+                      <a:noFill/>
+                    </a:lnL>
+                    <a:lnR>
+                      <a:noFill/>
+                    </a:lnR>
+                    <a:lnT>
+                      <a:noFill/>
+                    </a:lnT>
+                    <a:lnB>
+                      <a:noFill/>
+                    </a:lnB>
+                  </a:tcPr>
+                </a:tc>
+                <a:tc>
+                  <a:txBody>
+                    <a:bodyPr/>
+                    <a:lstStyle/>
+                    <a:p>
+                      <a:pPr algn="l" fontAlgn="b"/>
+                      <a:endParaRPr lang="en-US" sz="1700" b="0" i="0" u="none" strike="noStrike">
+                        <a:solidFill>
+                          <a:srgbClr val="000000"/>
+                        </a:solidFill>
+                        <a:effectLst/>
+                        <a:latin typeface="Calibri" panose="020F0502020204030204" pitchFamily="34" charset="0"/>
+                      </a:endParaRPr>
+                    </a:p>
+                  </a:txBody>
+                  <a:tcPr marL="13187" marR="13187" marT="13187" marB="0" anchor="b">
+                    <a:lnL>
+                      <a:noFill/>
+                    </a:lnL>
+                    <a:lnR>
+                      <a:noFill/>
+                    </a:lnR>
+                    <a:lnT>
+                      <a:noFill/>
+                    </a:lnT>
+                    <a:lnB>
+                      <a:noFill/>
+                    </a:lnB>
+                  </a:tcPr>
+                </a:tc>
+                <a:tc>
+                  <a:txBody>
+                    <a:bodyPr/>
+                    <a:lstStyle/>
+                    <a:p>
+                      <a:pPr marL="0" marR="0" algn="r">
+                        <a:lnSpc>
+                          <a:spcPct val="200000"/>
+                        </a:lnSpc>
+                        <a:spcBef>
+                          <a:spcPts val="0"/>
+                        </a:spcBef>
+                        <a:spcAft>
+                          <a:spcPts val="0"/>
+                        </a:spcAft>
+                      </a:pPr>
+                      <a:r>
+                        <a:rPr lang="en-US" sz="1600" i="0" dirty="0">
+                          <a:solidFill>
+                            <a:srgbClr val="000000"/>
+                          </a:solidFill>
+                          <a:effectLst/>
+                          <a:latin typeface="Calibri" panose="020F0502020204030204" pitchFamily="34" charset="0"/>
+                          <a:ea typeface="Times New Roman" panose="02020603050405020304" pitchFamily="18" charset="0"/>
+                          <a:cs typeface="Calibri" panose="020F0502020204030204" pitchFamily="34" charset="0"/>
+                        </a:rPr>
+                        <a:t>82 [25-100]</a:t>
+                      </a:r>
+                      <a:endParaRPr lang="en-US" sz="1600" i="0" dirty="0">
+                        <a:effectLst/>
+                        <a:latin typeface="Calibri" panose="020F0502020204030204" pitchFamily="34" charset="0"/>
+                        <a:ea typeface="Times New Roman" panose="02020603050405020304" pitchFamily="18" charset="0"/>
+                        <a:cs typeface="Calibri" panose="020F0502020204030204" pitchFamily="34" charset="0"/>
+                      </a:endParaRPr>
+                    </a:p>
+                  </a:txBody>
+                  <a:tcPr marL="68580" marR="68580" marT="0" marB="0">
+                    <a:lnL>
+                      <a:noFill/>
+                    </a:lnL>
+                    <a:lnR>
+                      <a:noFill/>
+                    </a:lnR>
+                    <a:lnT>
+                      <a:noFill/>
+                    </a:lnT>
+                    <a:lnB>
+                      <a:noFill/>
+                    </a:lnB>
+                  </a:tcPr>
+                </a:tc>
+                <a:tc>
+                  <a:txBody>
+                    <a:bodyPr/>
+                    <a:lstStyle/>
+                    <a:p>
+                      <a:pPr marL="0" marR="0" algn="r">
+                        <a:lnSpc>
+                          <a:spcPct val="200000"/>
+                        </a:lnSpc>
+                        <a:spcBef>
+                          <a:spcPts val="0"/>
+                        </a:spcBef>
+                        <a:spcAft>
+                          <a:spcPts val="0"/>
+                        </a:spcAft>
+                      </a:pPr>
+                      <a:r>
+                        <a:rPr lang="en-US" sz="1600" i="0" dirty="0">
+                          <a:solidFill>
+                            <a:srgbClr val="000000"/>
+                          </a:solidFill>
+                          <a:effectLst/>
+                          <a:latin typeface="Calibri" panose="020F0502020204030204" pitchFamily="34" charset="0"/>
+                          <a:ea typeface="Times New Roman" panose="02020603050405020304" pitchFamily="18" charset="0"/>
+                          <a:cs typeface="Calibri" panose="020F0502020204030204" pitchFamily="34" charset="0"/>
+                        </a:rPr>
+                        <a:t>87 [38 – 100]</a:t>
+                      </a:r>
+                      <a:endParaRPr lang="en-US" sz="1600" i="0" dirty="0">
+                        <a:effectLst/>
+                        <a:latin typeface="Calibri" panose="020F0502020204030204" pitchFamily="34" charset="0"/>
+                        <a:ea typeface="Times New Roman" panose="02020603050405020304" pitchFamily="18" charset="0"/>
+                        <a:cs typeface="Calibri" panose="020F0502020204030204" pitchFamily="34" charset="0"/>
+                      </a:endParaRPr>
+                    </a:p>
+                  </a:txBody>
+                  <a:tcPr marL="68580" marR="68580" marT="0" marB="0">
+                    <a:lnL>
+                      <a:noFill/>
+                    </a:lnL>
+                    <a:lnR>
+                      <a:noFill/>
+                    </a:lnR>
+                    <a:lnT>
+                      <a:noFill/>
+                    </a:lnT>
+                    <a:lnB>
+                      <a:noFill/>
+                    </a:lnB>
+                  </a:tcPr>
+                </a:tc>
+                <a:tc>
+                  <a:txBody>
+                    <a:bodyPr/>
+                    <a:lstStyle/>
+                    <a:p>
+                      <a:pPr marL="0" marR="0" algn="r">
+                        <a:lnSpc>
+                          <a:spcPct val="200000"/>
+                        </a:lnSpc>
+                        <a:spcBef>
+                          <a:spcPts val="0"/>
+                        </a:spcBef>
+                        <a:spcAft>
+                          <a:spcPts val="0"/>
+                        </a:spcAft>
+                      </a:pPr>
+                      <a:r>
+                        <a:rPr lang="en-US" sz="1600" i="0" dirty="0">
+                          <a:effectLst/>
+                          <a:latin typeface="Calibri" panose="020F0502020204030204" pitchFamily="34" charset="0"/>
+                          <a:ea typeface="Times New Roman" panose="02020603050405020304" pitchFamily="18" charset="0"/>
+                          <a:cs typeface="Calibri" panose="020F0502020204030204" pitchFamily="34" charset="0"/>
+                        </a:rPr>
+                        <a:t>2.48</a:t>
+                      </a:r>
+                    </a:p>
+                  </a:txBody>
+                  <a:tcPr marL="68580" marR="68580" marT="0" marB="0">
+                    <a:lnL>
+                      <a:noFill/>
+                    </a:lnL>
+                    <a:lnR>
+                      <a:noFill/>
+                    </a:lnR>
+                    <a:lnT>
+                      <a:noFill/>
+                    </a:lnT>
+                    <a:lnB>
+                      <a:noFill/>
+                    </a:lnB>
+                  </a:tcPr>
+                </a:tc>
+                <a:extLst>
+                  <a:ext uri="{0D108BD9-81ED-4DB2-BD59-A6C34878D82A}">
+                    <a16:rowId xmlns:a16="http://schemas.microsoft.com/office/drawing/2014/main" val="801422344"/>
+                  </a:ext>
+                </a:extLst>
+              </a:tr>
+              <a:tr h="266870">
+                <a:tc>
+                  <a:txBody>
+                    <a:bodyPr/>
+                    <a:lstStyle/>
+                    <a:p>
+                      <a:pPr algn="l" fontAlgn="b"/>
+                      <a:r>
+                        <a:rPr lang="en-US" sz="1700" b="0" i="0" u="none" strike="noStrike">
+                          <a:solidFill>
+                            <a:srgbClr val="000000"/>
+                          </a:solidFill>
+                          <a:effectLst/>
+                          <a:latin typeface="Calibri" panose="020F0502020204030204" pitchFamily="34" charset="0"/>
+                        </a:rPr>
+                        <a:t>fixed KSHV</a:t>
+                      </a:r>
+                    </a:p>
+                  </a:txBody>
+                  <a:tcPr marL="13187" marR="13187" marT="13187" marB="0" anchor="b">
+                    <a:lnL>
+                      <a:noFill/>
+                    </a:lnL>
+                    <a:lnR>
+                      <a:noFill/>
+                    </a:lnR>
+                    <a:lnT>
+                      <a:noFill/>
+                    </a:lnT>
+                    <a:lnB>
+                      <a:noFill/>
+                    </a:lnB>
+                    <a:solidFill>
+                      <a:srgbClr val="D0CECE"/>
+                    </a:solidFill>
+                  </a:tcPr>
+                </a:tc>
+                <a:tc>
+                  <a:txBody>
+                    <a:bodyPr/>
+                    <a:lstStyle/>
+                    <a:p>
+                      <a:pPr algn="r" fontAlgn="b"/>
+                      <a:r>
+                        <a:rPr lang="en-US" sz="1700" b="0" i="0" u="none" strike="noStrike">
+                          <a:solidFill>
+                            <a:srgbClr val="000000"/>
+                          </a:solidFill>
+                          <a:effectLst/>
+                          <a:latin typeface="Calibri" panose="020F0502020204030204" pitchFamily="34" charset="0"/>
+                        </a:rPr>
+                        <a:t>118</a:t>
+                      </a:r>
+                    </a:p>
+                  </a:txBody>
+                  <a:tcPr marL="13187" marR="13187" marT="13187" marB="0" anchor="b">
+                    <a:lnL>
+                      <a:noFill/>
+                    </a:lnL>
+                    <a:lnR>
+                      <a:noFill/>
+                    </a:lnR>
+                    <a:lnT>
+                      <a:noFill/>
+                    </a:lnT>
+                    <a:lnB>
+                      <a:noFill/>
+                    </a:lnB>
+                    <a:solidFill>
+                      <a:srgbClr val="D0CECE"/>
+                    </a:solidFill>
+                  </a:tcPr>
+                </a:tc>
+                <a:tc>
+                  <a:txBody>
+                    <a:bodyPr/>
+                    <a:lstStyle/>
+                    <a:p>
+                      <a:pPr algn="r" fontAlgn="b"/>
+                      <a:r>
+                        <a:rPr lang="en-US" sz="1700" b="0" i="0" u="none" strike="noStrike" dirty="0">
+                          <a:solidFill>
+                            <a:srgbClr val="000000"/>
+                          </a:solidFill>
+                          <a:effectLst/>
+                          <a:latin typeface="Calibri" panose="020F0502020204030204" pitchFamily="34" charset="0"/>
+                        </a:rPr>
+                        <a:t>33</a:t>
+                      </a:r>
+                    </a:p>
+                  </a:txBody>
+                  <a:tcPr marL="13187" marR="13187" marT="13187" marB="0" anchor="b">
+                    <a:lnL>
+                      <a:noFill/>
+                    </a:lnL>
+                    <a:lnR>
+                      <a:noFill/>
+                    </a:lnR>
+                    <a:lnT>
+                      <a:noFill/>
+                    </a:lnT>
+                    <a:lnB>
+                      <a:noFill/>
+                    </a:lnB>
+                    <a:solidFill>
+                      <a:srgbClr val="D0CECE"/>
+                    </a:solidFill>
+                  </a:tcPr>
+                </a:tc>
+                <a:tc>
+                  <a:txBody>
+                    <a:bodyPr/>
+                    <a:lstStyle/>
+                    <a:p>
+                      <a:pPr algn="r" fontAlgn="b"/>
+                      <a:r>
+                        <a:rPr lang="en-US" sz="1700" b="0" i="0" u="none" strike="noStrike" dirty="0">
+                          <a:solidFill>
+                            <a:srgbClr val="000000"/>
+                          </a:solidFill>
+                          <a:effectLst/>
+                          <a:latin typeface="Calibri" panose="020F0502020204030204" pitchFamily="34" charset="0"/>
+                        </a:rPr>
+                        <a:t>51</a:t>
+                      </a:r>
+                    </a:p>
+                  </a:txBody>
+                  <a:tcPr marL="13187" marR="13187" marT="13187" marB="0" anchor="b">
+                    <a:lnL>
+                      <a:noFill/>
+                    </a:lnL>
+                    <a:lnR>
+                      <a:noFill/>
+                    </a:lnR>
+                    <a:lnT>
+                      <a:noFill/>
+                    </a:lnT>
+                    <a:lnB>
+                      <a:noFill/>
+                    </a:lnB>
+                    <a:solidFill>
+                      <a:srgbClr val="D0CECE"/>
+                    </a:solidFill>
+                  </a:tcPr>
+                </a:tc>
+                <a:tc>
+                  <a:txBody>
+                    <a:bodyPr/>
+                    <a:lstStyle/>
+                    <a:p>
+                      <a:pPr algn="r" fontAlgn="b"/>
+                      <a:r>
+                        <a:rPr lang="en-US" sz="1600" dirty="0"/>
+                        <a:t>1928.42</a:t>
+                      </a:r>
+                      <a:endParaRPr lang="en-US" sz="1700" b="0" i="0" u="none" strike="noStrike" dirty="0">
+                        <a:solidFill>
+                          <a:srgbClr val="000000"/>
+                        </a:solidFill>
+                        <a:effectLst/>
+                        <a:latin typeface="Calibri" panose="020F0502020204030204" pitchFamily="34" charset="0"/>
+                      </a:endParaRPr>
+                    </a:p>
+                  </a:txBody>
+                  <a:tcPr marL="13187" marR="13187" marT="13187" marB="0" anchor="b">
+                    <a:lnL>
+                      <a:noFill/>
+                    </a:lnL>
+                    <a:lnR>
+                      <a:noFill/>
+                    </a:lnR>
+                    <a:lnT>
+                      <a:noFill/>
+                    </a:lnT>
+                    <a:lnB>
+                      <a:noFill/>
+                    </a:lnB>
+                    <a:solidFill>
+                      <a:srgbClr val="D0CECE"/>
+                    </a:solidFill>
+                  </a:tcPr>
+                </a:tc>
+                <a:tc>
+                  <a:txBody>
+                    <a:bodyPr/>
+                    <a:lstStyle/>
+                    <a:p>
+                      <a:pPr algn="r" fontAlgn="b"/>
+                      <a:r>
+                        <a:rPr lang="en-US" sz="1700" b="0" i="0" u="none" strike="noStrike" dirty="0">
+                          <a:solidFill>
+                            <a:srgbClr val="000000"/>
+                          </a:solidFill>
+                          <a:effectLst/>
+                          <a:latin typeface="Calibri" panose="020F0502020204030204" pitchFamily="34" charset="0"/>
+                        </a:rPr>
+                        <a:t>791.96</a:t>
+                      </a:r>
+                    </a:p>
+                  </a:txBody>
+                  <a:tcPr marL="13187" marR="13187" marT="13187" marB="0" anchor="b">
+                    <a:lnL>
+                      <a:noFill/>
+                    </a:lnL>
+                    <a:lnR>
+                      <a:noFill/>
+                    </a:lnR>
+                    <a:lnT>
+                      <a:noFill/>
+                    </a:lnT>
+                    <a:lnB>
+                      <a:noFill/>
+                    </a:lnB>
+                    <a:solidFill>
+                      <a:srgbClr val="D0CECE"/>
+                    </a:solidFill>
+                  </a:tcPr>
+                </a:tc>
+                <a:tc>
+                  <a:txBody>
+                    <a:bodyPr/>
+                    <a:lstStyle/>
+                    <a:p>
+                      <a:pPr algn="r" fontAlgn="b"/>
+                      <a:r>
+                        <a:rPr lang="en-US" sz="1600" dirty="0"/>
+                        <a:t>627201.80</a:t>
+                      </a:r>
+                      <a:endParaRPr lang="en-US" sz="1700" b="0" i="0" u="none" strike="noStrike" dirty="0">
+                        <a:solidFill>
+                          <a:srgbClr val="000000"/>
+                        </a:solidFill>
+                        <a:effectLst/>
+                        <a:latin typeface="Calibri" panose="020F0502020204030204" pitchFamily="34" charset="0"/>
+                      </a:endParaRPr>
+                    </a:p>
+                  </a:txBody>
+                  <a:tcPr marL="13187" marR="13187" marT="13187" marB="0" anchor="b">
+                    <a:lnL>
+                      <a:noFill/>
+                    </a:lnL>
+                    <a:lnR>
+                      <a:noFill/>
+                    </a:lnR>
+                    <a:lnT>
+                      <a:noFill/>
+                    </a:lnT>
+                    <a:lnB>
+                      <a:noFill/>
+                    </a:lnB>
+                    <a:solidFill>
+                      <a:srgbClr val="D0CECE"/>
+                    </a:solidFill>
+                  </a:tcPr>
+                </a:tc>
+                <a:tc>
+                  <a:txBody>
+                    <a:bodyPr/>
+                    <a:lstStyle/>
+                    <a:p>
+                      <a:pPr algn="l" fontAlgn="b"/>
+                      <a:r>
+                        <a:rPr lang="en-US" sz="1700" b="0" i="0" u="none" strike="noStrike">
+                          <a:solidFill>
+                            <a:srgbClr val="000000"/>
+                          </a:solidFill>
+                          <a:effectLst/>
+                          <a:latin typeface="Calibri" panose="020F0502020204030204" pitchFamily="34" charset="0"/>
+                        </a:rPr>
+                        <a:t> </a:t>
+                      </a:r>
+                    </a:p>
+                  </a:txBody>
+                  <a:tcPr marL="13187" marR="13187" marT="13187" marB="0" anchor="b">
+                    <a:lnL>
+                      <a:noFill/>
+                    </a:lnL>
+                    <a:lnR>
+                      <a:noFill/>
+                    </a:lnR>
+                    <a:lnT>
+                      <a:noFill/>
+                    </a:lnT>
+                    <a:lnB>
+                      <a:noFill/>
+                    </a:lnB>
+                    <a:solidFill>
+                      <a:srgbClr val="D0CECE"/>
+                    </a:solidFill>
+                  </a:tcPr>
+                </a:tc>
+                <a:tc>
+                  <a:txBody>
+                    <a:bodyPr/>
+                    <a:lstStyle/>
+                    <a:p>
+                      <a:pPr marL="0" marR="0" algn="r">
+                        <a:lnSpc>
+                          <a:spcPct val="200000"/>
+                        </a:lnSpc>
+                        <a:spcBef>
+                          <a:spcPts val="0"/>
+                        </a:spcBef>
+                        <a:spcAft>
+                          <a:spcPts val="0"/>
+                        </a:spcAft>
+                      </a:pPr>
+                      <a:r>
+                        <a:rPr lang="en-US" sz="1600" i="0" dirty="0">
+                          <a:solidFill>
+                            <a:srgbClr val="000000"/>
+                          </a:solidFill>
+                          <a:effectLst/>
+                          <a:latin typeface="Calibri" panose="020F0502020204030204" pitchFamily="34" charset="0"/>
+                          <a:ea typeface="Times New Roman" panose="02020603050405020304" pitchFamily="18" charset="0"/>
+                          <a:cs typeface="Calibri" panose="020F0502020204030204" pitchFamily="34" charset="0"/>
+                        </a:rPr>
+                        <a:t>66  [38-90]</a:t>
+                      </a:r>
+                      <a:endParaRPr lang="en-US" sz="1600" i="0" dirty="0">
+                        <a:effectLst/>
+                        <a:latin typeface="Calibri" panose="020F0502020204030204" pitchFamily="34" charset="0"/>
+                        <a:ea typeface="Times New Roman" panose="02020603050405020304" pitchFamily="18" charset="0"/>
+                        <a:cs typeface="Calibri" panose="020F0502020204030204" pitchFamily="34" charset="0"/>
+                      </a:endParaRPr>
+                    </a:p>
+                  </a:txBody>
+                  <a:tcPr marL="68580" marR="68580" marT="0" marB="0">
+                    <a:lnL>
+                      <a:noFill/>
+                    </a:lnL>
+                    <a:lnR>
+                      <a:noFill/>
+                    </a:lnR>
+                    <a:lnT>
+                      <a:noFill/>
+                    </a:lnT>
+                    <a:lnB>
+                      <a:noFill/>
+                    </a:lnB>
+                    <a:solidFill>
+                      <a:srgbClr val="D0CECE"/>
+                    </a:solidFill>
+                  </a:tcPr>
+                </a:tc>
+                <a:tc>
+                  <a:txBody>
+                    <a:bodyPr/>
+                    <a:lstStyle/>
+                    <a:p>
+                      <a:pPr marL="0" marR="0" algn="r">
+                        <a:lnSpc>
+                          <a:spcPct val="200000"/>
+                        </a:lnSpc>
+                        <a:spcBef>
+                          <a:spcPts val="0"/>
+                        </a:spcBef>
+                        <a:spcAft>
+                          <a:spcPts val="0"/>
+                        </a:spcAft>
+                      </a:pPr>
+                      <a:r>
+                        <a:rPr lang="en-US" sz="1600" i="0" dirty="0">
+                          <a:solidFill>
+                            <a:srgbClr val="000000"/>
+                          </a:solidFill>
+                          <a:effectLst/>
+                          <a:latin typeface="Calibri" panose="020F0502020204030204" pitchFamily="34" charset="0"/>
+                          <a:ea typeface="Times New Roman" panose="02020603050405020304" pitchFamily="18" charset="0"/>
+                          <a:cs typeface="Calibri" panose="020F0502020204030204" pitchFamily="34" charset="0"/>
+                        </a:rPr>
+                        <a:t>99 [76-100]</a:t>
+                      </a:r>
+                      <a:endParaRPr lang="en-US" sz="1600" i="0" dirty="0">
+                        <a:effectLst/>
+                        <a:latin typeface="Calibri" panose="020F0502020204030204" pitchFamily="34" charset="0"/>
+                        <a:ea typeface="Times New Roman" panose="02020603050405020304" pitchFamily="18" charset="0"/>
+                        <a:cs typeface="Calibri" panose="020F0502020204030204" pitchFamily="34" charset="0"/>
+                      </a:endParaRPr>
+                    </a:p>
+                  </a:txBody>
+                  <a:tcPr marL="68580" marR="68580" marT="0" marB="0">
+                    <a:lnL>
+                      <a:noFill/>
+                    </a:lnL>
+                    <a:lnR>
+                      <a:noFill/>
+                    </a:lnR>
+                    <a:lnT>
+                      <a:noFill/>
+                    </a:lnT>
+                    <a:lnB>
+                      <a:noFill/>
+                    </a:lnB>
+                    <a:solidFill>
+                      <a:srgbClr val="D0CECE"/>
+                    </a:solidFill>
+                  </a:tcPr>
+                </a:tc>
+                <a:tc>
+                  <a:txBody>
+                    <a:bodyPr/>
+                    <a:lstStyle/>
+                    <a:p>
+                      <a:pPr marL="0" marR="0" algn="r">
+                        <a:lnSpc>
+                          <a:spcPct val="200000"/>
+                        </a:lnSpc>
+                        <a:spcBef>
+                          <a:spcPts val="0"/>
+                        </a:spcBef>
+                        <a:spcAft>
+                          <a:spcPts val="0"/>
+                        </a:spcAft>
+                      </a:pPr>
+                      <a:r>
+                        <a:rPr lang="en-US" sz="1600" i="0" dirty="0">
+                          <a:effectLst/>
+                          <a:latin typeface="Calibri" panose="020F0502020204030204" pitchFamily="34" charset="0"/>
+                          <a:ea typeface="Times New Roman" panose="02020603050405020304" pitchFamily="18" charset="0"/>
+                          <a:cs typeface="Calibri" panose="020F0502020204030204" pitchFamily="34" charset="0"/>
+                        </a:rPr>
+                        <a:t>1.51</a:t>
+                      </a:r>
+                    </a:p>
+                  </a:txBody>
+                  <a:tcPr marL="68580" marR="68580" marT="0" marB="0">
+                    <a:lnL>
+                      <a:noFill/>
+                    </a:lnL>
+                    <a:lnR>
+                      <a:noFill/>
+                    </a:lnR>
+                    <a:lnT>
+                      <a:noFill/>
+                    </a:lnT>
+                    <a:lnB>
+                      <a:noFill/>
+                    </a:lnB>
+                    <a:solidFill>
+                      <a:srgbClr val="D0CECE"/>
+                    </a:solidFill>
+                  </a:tcPr>
+                </a:tc>
+                <a:extLst>
+                  <a:ext uri="{0D108BD9-81ED-4DB2-BD59-A6C34878D82A}">
+                    <a16:rowId xmlns:a16="http://schemas.microsoft.com/office/drawing/2014/main" val="3110762303"/>
+                  </a:ext>
+                </a:extLst>
+              </a:tr>
+              <a:tr h="266870">
+                <a:tc>
+                  <a:txBody>
+                    <a:bodyPr/>
+                    <a:lstStyle/>
+                    <a:p>
+                      <a:pPr algn="l" fontAlgn="b"/>
+                      <a:r>
+                        <a:rPr lang="en-US" sz="1700" b="0" i="0" u="none" strike="noStrike" dirty="0">
+                          <a:solidFill>
+                            <a:srgbClr val="000000"/>
+                          </a:solidFill>
+                          <a:effectLst/>
+                          <a:latin typeface="Calibri" panose="020F0502020204030204" pitchFamily="34" charset="0"/>
+                        </a:rPr>
+                        <a:t>live KSHV</a:t>
+                      </a:r>
+                    </a:p>
+                  </a:txBody>
+                  <a:tcPr marL="13187" marR="13187" marT="13187" marB="0" anchor="b">
+                    <a:lnL>
+                      <a:noFill/>
+                    </a:lnL>
+                    <a:lnR>
+                      <a:noFill/>
+                    </a:lnR>
+                    <a:lnT>
+                      <a:noFill/>
+                    </a:lnT>
+                    <a:lnB w="12700" cap="flat" cmpd="sng" algn="ctr">
+                      <a:solidFill>
+                        <a:schemeClr val="tx1"/>
+                      </a:solidFill>
+                      <a:prstDash val="solid"/>
+                      <a:round/>
+                      <a:headEnd type="none" w="med" len="med"/>
+                      <a:tailEnd type="none" w="med" len="med"/>
+                    </a:lnB>
+                  </a:tcPr>
+                </a:tc>
+                <a:tc>
+                  <a:txBody>
+                    <a:bodyPr/>
+                    <a:lstStyle/>
+                    <a:p>
+                      <a:pPr algn="r" fontAlgn="b"/>
+                      <a:r>
+                        <a:rPr lang="en-US" sz="1700" b="0" i="0" u="none" strike="noStrike" dirty="0">
+                          <a:solidFill>
+                            <a:srgbClr val="000000"/>
+                          </a:solidFill>
+                          <a:effectLst/>
+                          <a:latin typeface="Calibri" panose="020F0502020204030204" pitchFamily="34" charset="0"/>
+                        </a:rPr>
+                        <a:t>79</a:t>
+                      </a:r>
+                    </a:p>
+                  </a:txBody>
+                  <a:tcPr marL="13187" marR="13187" marT="13187" marB="0" anchor="b">
+                    <a:lnL>
+                      <a:noFill/>
+                    </a:lnL>
+                    <a:lnR>
+                      <a:noFill/>
+                    </a:lnR>
+                    <a:lnT>
+                      <a:noFill/>
+                    </a:lnT>
+                    <a:lnB w="12700" cap="flat" cmpd="sng" algn="ctr">
+                      <a:solidFill>
+                        <a:schemeClr val="tx1"/>
+                      </a:solidFill>
+                      <a:prstDash val="solid"/>
+                      <a:round/>
+                      <a:headEnd type="none" w="med" len="med"/>
+                      <a:tailEnd type="none" w="med" len="med"/>
+                    </a:lnB>
+                  </a:tcPr>
+                </a:tc>
+                <a:tc>
+                  <a:txBody>
+                    <a:bodyPr/>
+                    <a:lstStyle/>
+                    <a:p>
+                      <a:pPr algn="r" fontAlgn="b"/>
+                      <a:r>
+                        <a:rPr lang="en-US" sz="1700" b="0" i="0" u="none" strike="noStrike" dirty="0">
+                          <a:solidFill>
+                            <a:srgbClr val="000000"/>
+                          </a:solidFill>
+                          <a:effectLst/>
+                          <a:latin typeface="Calibri" panose="020F0502020204030204" pitchFamily="34" charset="0"/>
+                        </a:rPr>
+                        <a:t>23</a:t>
+                      </a:r>
+                    </a:p>
+                  </a:txBody>
+                  <a:tcPr marL="13187" marR="13187" marT="13187" marB="0" anchor="b">
+                    <a:lnL>
+                      <a:noFill/>
+                    </a:lnL>
+                    <a:lnR>
+                      <a:noFill/>
+                    </a:lnR>
+                    <a:lnT>
+                      <a:noFill/>
+                    </a:lnT>
+                    <a:lnB w="12700" cap="flat" cmpd="sng" algn="ctr">
+                      <a:solidFill>
+                        <a:schemeClr val="tx1"/>
+                      </a:solidFill>
+                      <a:prstDash val="solid"/>
+                      <a:round/>
+                      <a:headEnd type="none" w="med" len="med"/>
+                      <a:tailEnd type="none" w="med" len="med"/>
+                    </a:lnB>
+                  </a:tcPr>
+                </a:tc>
+                <a:tc>
+                  <a:txBody>
+                    <a:bodyPr/>
+                    <a:lstStyle/>
+                    <a:p>
+                      <a:pPr algn="r" fontAlgn="b"/>
+                      <a:r>
+                        <a:rPr lang="en-US" sz="1700" b="0" i="0" u="none" strike="noStrike" dirty="0">
+                          <a:solidFill>
+                            <a:srgbClr val="000000"/>
+                          </a:solidFill>
+                          <a:effectLst/>
+                          <a:latin typeface="Calibri" panose="020F0502020204030204" pitchFamily="34" charset="0"/>
+                        </a:rPr>
+                        <a:t>22</a:t>
+                      </a:r>
+                    </a:p>
+                  </a:txBody>
+                  <a:tcPr marL="13187" marR="13187" marT="13187" marB="0" anchor="b">
+                    <a:lnL>
+                      <a:noFill/>
+                    </a:lnL>
+                    <a:lnR>
+                      <a:noFill/>
+                    </a:lnR>
+                    <a:lnT>
+                      <a:noFill/>
+                    </a:lnT>
+                    <a:lnB w="12700" cap="flat" cmpd="sng" algn="ctr">
+                      <a:solidFill>
+                        <a:schemeClr val="tx1"/>
+                      </a:solidFill>
+                      <a:prstDash val="solid"/>
+                      <a:round/>
+                      <a:headEnd type="none" w="med" len="med"/>
+                      <a:tailEnd type="none" w="med" len="med"/>
+                    </a:lnB>
+                  </a:tcPr>
+                </a:tc>
+                <a:tc>
+                  <a:txBody>
+                    <a:bodyPr/>
+                    <a:lstStyle/>
+                    <a:p>
+                      <a:pPr algn="r"/>
+                      <a:r>
+                        <a:rPr lang="en-US" sz="1600" dirty="0">
+                          <a:latin typeface="Calibri" panose="020F0502020204030204" pitchFamily="34" charset="0"/>
+                          <a:cs typeface="Calibri" panose="020F0502020204030204" pitchFamily="34" charset="0"/>
+                        </a:rPr>
+                        <a:t>1200.54, </a:t>
+                      </a:r>
+                    </a:p>
+                    <a:p>
+                      <a:pPr algn="r"/>
+                      <a:r>
+                        <a:rPr lang="en-US" sz="1600" dirty="0">
+                          <a:latin typeface="Calibri" panose="020F0502020204030204" pitchFamily="34" charset="0"/>
+                          <a:cs typeface="Calibri" panose="020F0502020204030204" pitchFamily="34" charset="0"/>
+                        </a:rPr>
+                        <a:t>2742.54</a:t>
+                      </a:r>
+                    </a:p>
+                  </a:txBody>
+                  <a:tcPr marL="13187" marR="13187" marT="13187" marB="0" anchor="b">
+                    <a:lnL>
+                      <a:noFill/>
+                    </a:lnL>
+                    <a:lnR>
+                      <a:noFill/>
+                    </a:lnR>
+                    <a:lnT>
+                      <a:noFill/>
+                    </a:lnT>
+                    <a:lnB w="12700" cap="flat" cmpd="sng" algn="ctr">
+                      <a:solidFill>
+                        <a:schemeClr val="tx1"/>
+                      </a:solidFill>
+                      <a:prstDash val="solid"/>
+                      <a:round/>
+                      <a:headEnd type="none" w="med" len="med"/>
+                      <a:tailEnd type="none" w="med" len="med"/>
+                    </a:lnB>
+                  </a:tcPr>
+                </a:tc>
+                <a:tc>
+                  <a:txBody>
+                    <a:bodyPr/>
+                    <a:lstStyle/>
+                    <a:p>
+                      <a:pPr marL="0" marR="0" lvl="0" indent="0" algn="r" defTabSz="914400" rtl="0" eaLnBrk="1" fontAlgn="b" latinLnBrk="0" hangingPunct="1">
+                        <a:lnSpc>
+                          <a:spcPct val="100000"/>
+                        </a:lnSpc>
+                        <a:spcBef>
+                          <a:spcPts val="0"/>
+                        </a:spcBef>
+                        <a:spcAft>
+                          <a:spcPts val="0"/>
+                        </a:spcAft>
+                        <a:buClrTx/>
+                        <a:buSzTx/>
+                        <a:buFontTx/>
+                        <a:buNone/>
+                        <a:tabLst/>
+                        <a:defRPr/>
+                      </a:pPr>
+                      <a:r>
+                        <a:rPr lang="en-US" sz="1600" b="0" i="0" u="none" strike="noStrike" kern="1200" dirty="0">
+                          <a:solidFill>
+                            <a:srgbClr val="000000"/>
+                          </a:solidFill>
+                          <a:effectLst/>
+                          <a:latin typeface="Calibri" panose="020F0502020204030204" pitchFamily="34" charset="0"/>
+                          <a:cs typeface="Calibri" panose="020F0502020204030204" pitchFamily="34" charset="0"/>
+                        </a:rPr>
+                        <a:t>555.69, 1052.839 </a:t>
+                      </a:r>
+                      <a:endParaRPr lang="en-US" sz="1600" b="0" i="0" u="none" strike="noStrike" dirty="0">
+                        <a:effectLst/>
+                        <a:latin typeface="Calibri" panose="020F0502020204030204" pitchFamily="34" charset="0"/>
+                        <a:cs typeface="Calibri" panose="020F0502020204030204" pitchFamily="34" charset="0"/>
+                      </a:endParaRPr>
+                    </a:p>
+                  </a:txBody>
+                  <a:tcPr marL="13187" marR="13187" marT="13187" marB="0" anchor="b">
+                    <a:lnL>
+                      <a:noFill/>
+                    </a:lnL>
+                    <a:lnR>
+                      <a:noFill/>
+                    </a:lnR>
+                    <a:lnT>
+                      <a:noFill/>
+                    </a:lnT>
+                    <a:lnB w="12700" cap="flat" cmpd="sng" algn="ctr">
+                      <a:solidFill>
+                        <a:schemeClr val="tx1"/>
+                      </a:solidFill>
+                      <a:prstDash val="solid"/>
+                      <a:round/>
+                      <a:headEnd type="none" w="med" len="med"/>
+                      <a:tailEnd type="none" w="med" len="med"/>
+                    </a:lnB>
+                  </a:tcPr>
+                </a:tc>
+                <a:tc>
+                  <a:txBody>
+                    <a:bodyPr/>
+                    <a:lstStyle/>
+                    <a:p>
+                      <a:pPr marL="0" marR="0" lvl="0" indent="0" algn="r" defTabSz="914400" rtl="0" eaLnBrk="1" fontAlgn="b" latinLnBrk="0" hangingPunct="1">
+                        <a:lnSpc>
+                          <a:spcPct val="100000"/>
+                        </a:lnSpc>
+                        <a:spcBef>
+                          <a:spcPts val="0"/>
+                        </a:spcBef>
+                        <a:spcAft>
+                          <a:spcPts val="0"/>
+                        </a:spcAft>
+                        <a:buClrTx/>
+                        <a:buSzTx/>
+                        <a:buFontTx/>
+                        <a:buNone/>
+                        <a:tabLst/>
+                        <a:defRPr/>
+                      </a:pPr>
+                      <a:r>
+                        <a:rPr lang="en-US" sz="1600" dirty="0">
+                          <a:latin typeface="Calibri" panose="020F0502020204030204" pitchFamily="34" charset="0"/>
+                          <a:cs typeface="Calibri" panose="020F0502020204030204" pitchFamily="34" charset="0"/>
+                        </a:rPr>
+                        <a:t>308790.6, 1108469 </a:t>
+                      </a:r>
+                      <a:endParaRPr lang="en-US" sz="1600" b="0" i="0" u="none" strike="noStrike" dirty="0">
+                        <a:solidFill>
+                          <a:srgbClr val="000000"/>
+                        </a:solidFill>
+                        <a:effectLst/>
+                        <a:latin typeface="Calibri" panose="020F0502020204030204" pitchFamily="34" charset="0"/>
+                        <a:cs typeface="Calibri" panose="020F0502020204030204" pitchFamily="34" charset="0"/>
+                      </a:endParaRPr>
+                    </a:p>
+                  </a:txBody>
+                  <a:tcPr marL="13187" marR="13187" marT="13187" marB="0" anchor="b">
+                    <a:lnL>
+                      <a:noFill/>
+                    </a:lnL>
+                    <a:lnR>
+                      <a:noFill/>
+                    </a:lnR>
+                    <a:lnT>
+                      <a:noFill/>
+                    </a:lnT>
+                    <a:lnB w="12700" cap="flat" cmpd="sng" algn="ctr">
+                      <a:solidFill>
+                        <a:schemeClr val="tx1"/>
+                      </a:solidFill>
+                      <a:prstDash val="solid"/>
+                      <a:round/>
+                      <a:headEnd type="none" w="med" len="med"/>
+                      <a:tailEnd type="none" w="med" len="med"/>
+                    </a:lnB>
+                  </a:tcPr>
+                </a:tc>
+                <a:tc>
+                  <a:txBody>
+                    <a:bodyPr/>
+                    <a:lstStyle/>
+                    <a:p>
+                      <a:pPr algn="l" fontAlgn="b"/>
+                      <a:endParaRPr lang="en-US" sz="1700" b="0" i="0" u="none" strike="noStrike" dirty="0">
+                        <a:solidFill>
+                          <a:srgbClr val="000000"/>
+                        </a:solidFill>
+                        <a:effectLst/>
+                        <a:latin typeface="Calibri" panose="020F0502020204030204" pitchFamily="34" charset="0"/>
+                      </a:endParaRPr>
+                    </a:p>
+                  </a:txBody>
+                  <a:tcPr marL="13187" marR="13187" marT="13187" marB="0" anchor="b">
+                    <a:lnL>
+                      <a:noFill/>
+                    </a:lnL>
+                    <a:lnR>
+                      <a:noFill/>
+                    </a:lnR>
+                    <a:lnT>
+                      <a:noFill/>
+                    </a:lnT>
+                    <a:lnB w="12700" cap="flat" cmpd="sng" algn="ctr">
+                      <a:solidFill>
+                        <a:schemeClr val="tx1"/>
+                      </a:solidFill>
+                      <a:prstDash val="solid"/>
+                      <a:round/>
+                      <a:headEnd type="none" w="med" len="med"/>
+                      <a:tailEnd type="none" w="med" len="med"/>
+                    </a:lnB>
+                  </a:tcPr>
+                </a:tc>
+                <a:tc>
+                  <a:txBody>
+                    <a:bodyPr/>
+                    <a:lstStyle/>
+                    <a:p>
+                      <a:pPr marL="0" marR="0" algn="r">
+                        <a:lnSpc>
+                          <a:spcPct val="200000"/>
+                        </a:lnSpc>
+                        <a:spcBef>
+                          <a:spcPts val="0"/>
+                        </a:spcBef>
+                        <a:spcAft>
+                          <a:spcPts val="0"/>
+                        </a:spcAft>
+                      </a:pPr>
+                      <a:r>
+                        <a:rPr lang="en-US" sz="1600" i="0">
+                          <a:solidFill>
+                            <a:srgbClr val="000000"/>
+                          </a:solidFill>
+                          <a:effectLst/>
+                          <a:latin typeface="Calibri" panose="020F0502020204030204" pitchFamily="34" charset="0"/>
+                          <a:ea typeface="Times New Roman" panose="02020603050405020304" pitchFamily="18" charset="0"/>
+                          <a:cs typeface="Calibri" panose="020F0502020204030204" pitchFamily="34" charset="0"/>
+                        </a:rPr>
+                        <a:t>73 [32-97]</a:t>
+                      </a:r>
+                      <a:endParaRPr lang="en-US" sz="1600" i="0">
+                        <a:effectLst/>
+                        <a:latin typeface="Calibri" panose="020F0502020204030204" pitchFamily="34" charset="0"/>
+                        <a:ea typeface="Times New Roman" panose="02020603050405020304" pitchFamily="18" charset="0"/>
+                        <a:cs typeface="Calibri" panose="020F0502020204030204" pitchFamily="34" charset="0"/>
+                      </a:endParaRPr>
+                    </a:p>
+                  </a:txBody>
+                  <a:tcPr marL="68580" marR="68580" marT="0" marB="0">
+                    <a:lnL>
+                      <a:noFill/>
+                    </a:lnL>
+                    <a:lnR>
+                      <a:noFill/>
+                    </a:lnR>
+                    <a:lnT>
+                      <a:noFill/>
+                    </a:lnT>
+                    <a:lnB w="12700" cap="flat" cmpd="sng" algn="ctr">
+                      <a:solidFill>
+                        <a:schemeClr val="tx1"/>
+                      </a:solidFill>
+                      <a:prstDash val="solid"/>
+                      <a:round/>
+                      <a:headEnd type="none" w="med" len="med"/>
+                      <a:tailEnd type="none" w="med" len="med"/>
+                    </a:lnB>
+                  </a:tcPr>
+                </a:tc>
+                <a:tc>
+                  <a:txBody>
+                    <a:bodyPr/>
+                    <a:lstStyle/>
+                    <a:p>
+                      <a:pPr marL="0" marR="0" algn="r">
+                        <a:lnSpc>
+                          <a:spcPct val="200000"/>
+                        </a:lnSpc>
+                        <a:spcBef>
+                          <a:spcPts val="0"/>
+                        </a:spcBef>
+                        <a:spcAft>
+                          <a:spcPts val="0"/>
+                        </a:spcAft>
+                      </a:pPr>
+                      <a:r>
+                        <a:rPr lang="en-US" sz="1600" i="0" dirty="0">
+                          <a:solidFill>
+                            <a:srgbClr val="000000"/>
+                          </a:solidFill>
+                          <a:effectLst/>
+                          <a:latin typeface="Calibri" panose="020F0502020204030204" pitchFamily="34" charset="0"/>
+                          <a:ea typeface="Times New Roman" panose="02020603050405020304" pitchFamily="18" charset="0"/>
+                          <a:cs typeface="Calibri" panose="020F0502020204030204" pitchFamily="34" charset="0"/>
+                        </a:rPr>
+                        <a:t>92 [64-100]</a:t>
+                      </a:r>
+                      <a:endParaRPr lang="en-US" sz="1600" i="0" dirty="0">
+                        <a:effectLst/>
+                        <a:latin typeface="Calibri" panose="020F0502020204030204" pitchFamily="34" charset="0"/>
+                        <a:ea typeface="Times New Roman" panose="02020603050405020304" pitchFamily="18" charset="0"/>
+                        <a:cs typeface="Calibri" panose="020F0502020204030204" pitchFamily="34" charset="0"/>
+                      </a:endParaRPr>
+                    </a:p>
+                  </a:txBody>
+                  <a:tcPr marL="68580" marR="68580" marT="0" marB="0">
+                    <a:lnL>
+                      <a:noFill/>
+                    </a:lnL>
+                    <a:lnR>
+                      <a:noFill/>
+                    </a:lnR>
+                    <a:lnT>
+                      <a:noFill/>
+                    </a:lnT>
+                    <a:lnB w="12700" cap="flat" cmpd="sng" algn="ctr">
+                      <a:solidFill>
+                        <a:schemeClr val="tx1"/>
+                      </a:solidFill>
+                      <a:prstDash val="solid"/>
+                      <a:round/>
+                      <a:headEnd type="none" w="med" len="med"/>
+                      <a:tailEnd type="none" w="med" len="med"/>
+                    </a:lnB>
+                  </a:tcPr>
+                </a:tc>
+                <a:tc>
+                  <a:txBody>
+                    <a:bodyPr/>
+                    <a:lstStyle/>
+                    <a:p>
+                      <a:pPr marL="0" marR="0" algn="r">
+                        <a:lnSpc>
+                          <a:spcPct val="200000"/>
+                        </a:lnSpc>
+                        <a:spcBef>
+                          <a:spcPts val="0"/>
+                        </a:spcBef>
+                        <a:spcAft>
+                          <a:spcPts val="0"/>
+                        </a:spcAft>
+                      </a:pPr>
+                      <a:r>
+                        <a:rPr lang="en-US" sz="1600" i="0" dirty="0">
+                          <a:effectLst/>
+                          <a:latin typeface="Calibri" panose="020F0502020204030204" pitchFamily="34" charset="0"/>
+                          <a:ea typeface="Times New Roman" panose="02020603050405020304" pitchFamily="18" charset="0"/>
+                          <a:cs typeface="Calibri" panose="020F0502020204030204" pitchFamily="34" charset="0"/>
+                        </a:rPr>
+                        <a:t>2.04</a:t>
+                      </a:r>
+                    </a:p>
+                  </a:txBody>
+                  <a:tcPr marL="68580" marR="68580" marT="0" marB="0">
+                    <a:lnL>
+                      <a:noFill/>
+                    </a:lnL>
+                    <a:lnR>
+                      <a:noFill/>
+                    </a:lnR>
+                    <a:lnT>
+                      <a:noFill/>
+                    </a:lnT>
+                    <a:lnB w="12700" cap="flat" cmpd="sng" algn="ctr">
+                      <a:solidFill>
+                        <a:schemeClr val="tx1"/>
+                      </a:solidFill>
+                      <a:prstDash val="solid"/>
+                      <a:round/>
+                      <a:headEnd type="none" w="med" len="med"/>
+                      <a:tailEnd type="none" w="med" len="med"/>
+                    </a:lnB>
+                  </a:tcPr>
+                </a:tc>
+                <a:extLst>
+                  <a:ext uri="{0D108BD9-81ED-4DB2-BD59-A6C34878D82A}">
+                    <a16:rowId xmlns:a16="http://schemas.microsoft.com/office/drawing/2014/main" val="2363071006"/>
+                  </a:ext>
+                </a:extLst>
+              </a:tr>
+              <a:tr h="266870">
+                <a:tc gridSpan="10">
+                  <a:txBody>
+                    <a:bodyPr/>
+                    <a:lstStyle/>
+                    <a:p>
+                      <a:pPr algn="l" fontAlgn="b"/>
+                      <a:r>
+                        <a:rPr lang="en-US" sz="1200" b="0" i="0" u="none" strike="noStrike" dirty="0">
+                          <a:solidFill>
+                            <a:srgbClr val="000000"/>
+                          </a:solidFill>
+                          <a:effectLst/>
+                          <a:latin typeface="Calibri" panose="020F0502020204030204" pitchFamily="34" charset="0"/>
+                        </a:rPr>
+                        <a:t>* Parameters determined as the median of the sampled values </a:t>
+                      </a:r>
+                    </a:p>
+                  </a:txBody>
+                  <a:tcPr marL="13187" marR="13187" marT="13187" marB="0" anchor="b">
+                    <a:lnL>
+                      <a:noFill/>
+                    </a:lnL>
+                    <a:lnR>
+                      <a:noFill/>
+                    </a:lnR>
+                    <a:lnT w="12700" cap="flat" cmpd="sng" algn="ctr">
+                      <a:solidFill>
+                        <a:schemeClr val="tx1"/>
+                      </a:solidFill>
+                      <a:prstDash val="solid"/>
+                      <a:round/>
+                      <a:headEnd type="none" w="med" len="med"/>
+                      <a:tailEnd type="none" w="med" len="med"/>
+                    </a:lnT>
+                    <a:lnB w="6350" cap="flat" cmpd="sng" algn="ctr">
+                      <a:noFill/>
+                      <a:prstDash val="solid"/>
+                      <a:round/>
+                      <a:headEnd type="none" w="med" len="med"/>
+                      <a:tailEnd type="none" w="med" len="med"/>
+                    </a:lnB>
+                    <a:lnTlToBr w="12700" cmpd="sng">
+                      <a:noFill/>
+                      <a:prstDash val="solid"/>
+                    </a:lnTlToBr>
+                    <a:lnBlToTr w="12700" cmpd="sng">
+                      <a:noFill/>
+                      <a:prstDash val="solid"/>
+                    </a:lnBlToTr>
+                  </a:tcPr>
+                </a:tc>
+                <a:tc hMerge="1">
+                  <a:txBody>
+                    <a:bodyPr/>
+                    <a:lstStyle/>
+                    <a:p>
+                      <a:pPr algn="r" fontAlgn="b"/>
+                      <a:endParaRPr lang="en-US" sz="1700" b="0" i="0" u="none" strike="noStrike" dirty="0">
+                        <a:solidFill>
+                          <a:srgbClr val="000000"/>
+                        </a:solidFill>
+                        <a:effectLst/>
+                        <a:latin typeface="Calibri" panose="020F0502020204030204" pitchFamily="34" charset="0"/>
+                      </a:endParaRPr>
+                    </a:p>
+                  </a:txBody>
+                  <a:tcPr marL="13187" marR="13187" marT="13187" marB="0" anchor="b">
+                    <a:lnL>
+                      <a:noFill/>
+                    </a:lnL>
+                    <a:lnR>
+                      <a:noFill/>
+                    </a:lnR>
+                    <a:lnT w="12700" cap="flat" cmpd="sng" algn="ctr">
+                      <a:solidFill>
+                        <a:schemeClr val="tx1"/>
+                      </a:solidFill>
+                      <a:prstDash val="solid"/>
+                      <a:round/>
+                      <a:headEnd type="none" w="med" len="med"/>
+                      <a:tailEnd type="none" w="med" len="med"/>
+                    </a:lnT>
+                    <a:lnB w="6350" cap="flat" cmpd="sng" algn="ctr">
+                      <a:solidFill>
+                        <a:srgbClr val="000000"/>
+                      </a:solidFill>
+                      <a:prstDash val="solid"/>
+                      <a:round/>
+                      <a:headEnd type="none" w="med" len="med"/>
+                      <a:tailEnd type="none" w="med" len="med"/>
+                    </a:lnB>
+                  </a:tcPr>
+                </a:tc>
+                <a:tc hMerge="1">
+                  <a:txBody>
+                    <a:bodyPr/>
+                    <a:lstStyle/>
+                    <a:p>
+                      <a:endParaRPr lang="en-US"/>
+                    </a:p>
+                  </a:txBody>
+                  <a:tcPr/>
+                </a:tc>
+                <a:tc hMerge="1">
+                  <a:txBody>
+                    <a:bodyPr/>
+                    <a:lstStyle/>
+                    <a:p>
+                      <a:endParaRPr lang="en-US"/>
+                    </a:p>
+                  </a:txBody>
+                  <a:tcPr/>
+                </a:tc>
+                <a:tc hMerge="1">
+                  <a:txBody>
+                    <a:bodyPr/>
+                    <a:lstStyle/>
+                    <a:p>
+                      <a:pPr algn="r" fontAlgn="b"/>
+                      <a:endParaRPr lang="en-US" sz="1700" b="0" i="0" u="none" strike="noStrike" dirty="0">
+                        <a:solidFill>
+                          <a:srgbClr val="000000"/>
+                        </a:solidFill>
+                        <a:effectLst/>
+                        <a:latin typeface="Calibri" panose="020F0502020204030204" pitchFamily="34" charset="0"/>
+                      </a:endParaRPr>
+                    </a:p>
+                  </a:txBody>
+                  <a:tcPr marL="13187" marR="13187" marT="13187" marB="0" anchor="b">
+                    <a:lnL>
+                      <a:noFill/>
+                    </a:lnL>
+                    <a:lnR>
+                      <a:noFill/>
+                    </a:lnR>
+                    <a:lnT w="12700" cap="flat" cmpd="sng" algn="ctr">
+                      <a:solidFill>
+                        <a:schemeClr val="tx1"/>
+                      </a:solidFill>
+                      <a:prstDash val="solid"/>
+                      <a:round/>
+                      <a:headEnd type="none" w="med" len="med"/>
+                      <a:tailEnd type="none" w="med" len="med"/>
+                    </a:lnT>
+                    <a:lnB w="6350" cap="flat" cmpd="sng" algn="ctr">
+                      <a:solidFill>
+                        <a:srgbClr val="000000"/>
+                      </a:solidFill>
+                      <a:prstDash val="solid"/>
+                      <a:round/>
+                      <a:headEnd type="none" w="med" len="med"/>
+                      <a:tailEnd type="none" w="med" len="med"/>
+                    </a:lnB>
+                  </a:tcPr>
+                </a:tc>
+                <a:tc hMerge="1">
+                  <a:txBody>
+                    <a:bodyPr/>
+                    <a:lstStyle/>
+                    <a:p>
+                      <a:pPr algn="r" fontAlgn="b"/>
+                      <a:endParaRPr lang="en-US" sz="1700" b="0" i="0" u="none" strike="noStrike" dirty="0">
+                        <a:solidFill>
+                          <a:srgbClr val="000000"/>
+                        </a:solidFill>
+                        <a:effectLst/>
+                        <a:latin typeface="Calibri" panose="020F0502020204030204" pitchFamily="34" charset="0"/>
+                      </a:endParaRPr>
+                    </a:p>
+                  </a:txBody>
+                  <a:tcPr marL="13187" marR="13187" marT="13187" marB="0" anchor="b">
+                    <a:lnL>
+                      <a:noFill/>
+                    </a:lnL>
+                    <a:lnR>
+                      <a:noFill/>
+                    </a:lnR>
+                    <a:lnT w="12700" cap="flat" cmpd="sng" algn="ctr">
+                      <a:solidFill>
+                        <a:schemeClr val="tx1"/>
+                      </a:solidFill>
+                      <a:prstDash val="solid"/>
+                      <a:round/>
+                      <a:headEnd type="none" w="med" len="med"/>
+                      <a:tailEnd type="none" w="med" len="med"/>
+                    </a:lnT>
+                    <a:lnB w="6350" cap="flat" cmpd="sng" algn="ctr">
+                      <a:solidFill>
+                        <a:srgbClr val="000000"/>
+                      </a:solidFill>
+                      <a:prstDash val="solid"/>
+                      <a:round/>
+                      <a:headEnd type="none" w="med" len="med"/>
+                      <a:tailEnd type="none" w="med" len="med"/>
+                    </a:lnB>
+                  </a:tcPr>
+                </a:tc>
+                <a:tc hMerge="1">
+                  <a:txBody>
+                    <a:bodyPr/>
+                    <a:lstStyle/>
+                    <a:p>
+                      <a:pPr algn="r" fontAlgn="b"/>
+                      <a:endParaRPr lang="en-US" sz="1700" b="0" i="0" u="none" strike="noStrike" dirty="0">
+                        <a:solidFill>
+                          <a:srgbClr val="000000"/>
+                        </a:solidFill>
+                        <a:effectLst/>
+                        <a:latin typeface="Calibri" panose="020F0502020204030204" pitchFamily="34" charset="0"/>
+                      </a:endParaRPr>
+                    </a:p>
+                  </a:txBody>
+                  <a:tcPr marL="13187" marR="13187" marT="13187" marB="0" anchor="b">
+                    <a:lnL>
+                      <a:noFill/>
+                    </a:lnL>
+                    <a:lnR>
+                      <a:noFill/>
+                    </a:lnR>
+                    <a:lnT w="12700" cap="flat" cmpd="sng" algn="ctr">
+                      <a:solidFill>
+                        <a:schemeClr val="tx1"/>
+                      </a:solidFill>
+                      <a:prstDash val="solid"/>
+                      <a:round/>
+                      <a:headEnd type="none" w="med" len="med"/>
+                      <a:tailEnd type="none" w="med" len="med"/>
+                    </a:lnT>
+                    <a:lnB w="6350" cap="flat" cmpd="sng" algn="ctr">
+                      <a:solidFill>
+                        <a:srgbClr val="000000"/>
+                      </a:solidFill>
+                      <a:prstDash val="solid"/>
+                      <a:round/>
+                      <a:headEnd type="none" w="med" len="med"/>
+                      <a:tailEnd type="none" w="med" len="med"/>
+                    </a:lnB>
+                  </a:tcPr>
+                </a:tc>
+                <a:tc hMerge="1">
+                  <a:txBody>
+                    <a:bodyPr/>
+                    <a:lstStyle/>
+                    <a:p>
+                      <a:pPr algn="l" fontAlgn="b"/>
+                      <a:endParaRPr lang="en-US" sz="1700" b="0" i="0" u="none" strike="noStrike">
+                        <a:solidFill>
+                          <a:srgbClr val="000000"/>
+                        </a:solidFill>
+                        <a:effectLst/>
+                        <a:latin typeface="Calibri" panose="020F0502020204030204" pitchFamily="34" charset="0"/>
+                      </a:endParaRPr>
+                    </a:p>
+                  </a:txBody>
+                  <a:tcPr marL="13187" marR="13187" marT="13187" marB="0" anchor="b">
+                    <a:lnL>
+                      <a:noFill/>
+                    </a:lnL>
+                    <a:lnR>
+                      <a:noFill/>
+                    </a:lnR>
+                    <a:lnT w="12700" cap="flat" cmpd="sng" algn="ctr">
+                      <a:solidFill>
+                        <a:schemeClr val="tx1"/>
+                      </a:solidFill>
+                      <a:prstDash val="solid"/>
+                      <a:round/>
+                      <a:headEnd type="none" w="med" len="med"/>
+                      <a:tailEnd type="none" w="med" len="med"/>
+                    </a:lnT>
+                    <a:lnB w="6350" cap="flat" cmpd="sng" algn="ctr">
+                      <a:solidFill>
+                        <a:srgbClr val="000000"/>
+                      </a:solidFill>
+                      <a:prstDash val="solid"/>
+                      <a:round/>
+                      <a:headEnd type="none" w="med" len="med"/>
+                      <a:tailEnd type="none" w="med" len="med"/>
+                    </a:lnB>
+                  </a:tcPr>
+                </a:tc>
+                <a:tc hMerge="1">
+                  <a:txBody>
+                    <a:bodyPr/>
+                    <a:lstStyle/>
+                    <a:p>
+                      <a:pPr algn="r" fontAlgn="b"/>
+                      <a:endParaRPr lang="en-US" sz="1700" b="0" i="0" u="none" strike="noStrike" dirty="0">
+                        <a:solidFill>
+                          <a:srgbClr val="000000"/>
+                        </a:solidFill>
+                        <a:effectLst/>
+                        <a:latin typeface="Calibri" panose="020F0502020204030204" pitchFamily="34" charset="0"/>
+                      </a:endParaRPr>
+                    </a:p>
+                  </a:txBody>
+                  <a:tcPr marL="13187" marR="13187" marT="13187" marB="0" anchor="b">
+                    <a:lnL>
+                      <a:noFill/>
+                    </a:lnL>
+                    <a:lnR>
+                      <a:noFill/>
+                    </a:lnR>
+                    <a:lnT w="12700" cap="flat" cmpd="sng" algn="ctr">
+                      <a:solidFill>
+                        <a:schemeClr val="tx1"/>
+                      </a:solidFill>
+                      <a:prstDash val="solid"/>
+                      <a:round/>
+                      <a:headEnd type="none" w="med" len="med"/>
+                      <a:tailEnd type="none" w="med" len="med"/>
+                    </a:lnT>
+                    <a:lnB w="6350" cap="flat" cmpd="sng" algn="ctr">
+                      <a:solidFill>
+                        <a:srgbClr val="000000"/>
+                      </a:solidFill>
+                      <a:prstDash val="solid"/>
+                      <a:round/>
+                      <a:headEnd type="none" w="med" len="med"/>
+                      <a:tailEnd type="none" w="med" len="med"/>
+                    </a:lnB>
+                  </a:tcPr>
+                </a:tc>
+                <a:tc hMerge="1">
+                  <a:txBody>
+                    <a:bodyPr/>
+                    <a:lstStyle/>
+                    <a:p>
+                      <a:pPr algn="r" fontAlgn="b"/>
+                      <a:endParaRPr lang="en-US" sz="1700" b="0" i="0" u="none" strike="noStrike" dirty="0">
+                        <a:solidFill>
+                          <a:srgbClr val="000000"/>
+                        </a:solidFill>
+                        <a:effectLst/>
+                        <a:latin typeface="Calibri" panose="020F0502020204030204" pitchFamily="34" charset="0"/>
+                      </a:endParaRPr>
+                    </a:p>
+                  </a:txBody>
+                  <a:tcPr marL="13187" marR="13187" marT="13187" marB="0" anchor="b">
+                    <a:lnL>
+                      <a:noFill/>
+                    </a:lnL>
+                    <a:lnR>
+                      <a:noFill/>
+                    </a:lnR>
+                    <a:lnT w="12700" cap="flat" cmpd="sng" algn="ctr">
+                      <a:solidFill>
+                        <a:schemeClr val="tx1"/>
+                      </a:solidFill>
+                      <a:prstDash val="solid"/>
+                      <a:round/>
+                      <a:headEnd type="none" w="med" len="med"/>
+                      <a:tailEnd type="none" w="med" len="med"/>
+                    </a:lnT>
+                    <a:lnB w="6350" cap="flat" cmpd="sng" algn="ctr">
+                      <a:solidFill>
+                        <a:srgbClr val="000000"/>
+                      </a:solidFill>
+                      <a:prstDash val="solid"/>
+                      <a:round/>
+                      <a:headEnd type="none" w="med" len="med"/>
+                      <a:tailEnd type="none" w="med" len="med"/>
+                    </a:lnB>
+                  </a:tcPr>
+                </a:tc>
+                <a:tc>
+                  <a:txBody>
+                    <a:bodyPr/>
+                    <a:lstStyle/>
+                    <a:p>
+                      <a:pPr algn="l" fontAlgn="b"/>
+                      <a:endParaRPr lang="en-US" sz="1200" b="0" i="0" u="none" strike="noStrike" dirty="0">
+                        <a:solidFill>
+                          <a:srgbClr val="000000"/>
+                        </a:solidFill>
+                        <a:effectLst/>
+                        <a:latin typeface="Calibri" panose="020F0502020204030204" pitchFamily="34" charset="0"/>
+                      </a:endParaRPr>
+                    </a:p>
+                  </a:txBody>
+                  <a:tcPr marL="13187" marR="13187" marT="13187" marB="0" anchor="b">
+                    <a:lnL>
+                      <a:noFill/>
+                    </a:lnL>
+                    <a:lnR>
+                      <a:noFill/>
+                    </a:lnR>
+                    <a:lnT w="12700" cap="flat" cmpd="sng" algn="ctr">
+                      <a:solidFill>
+                        <a:schemeClr val="tx1"/>
+                      </a:solidFill>
+                      <a:prstDash val="solid"/>
+                      <a:round/>
+                      <a:headEnd type="none" w="med" len="med"/>
+                      <a:tailEnd type="none" w="med" len="med"/>
+                    </a:lnT>
+                    <a:lnB w="6350" cap="flat" cmpd="sng" algn="ctr">
+                      <a:noFill/>
+                      <a:prstDash val="solid"/>
+                      <a:round/>
+                      <a:headEnd type="none" w="med" len="med"/>
+                      <a:tailEnd type="none" w="med" len="med"/>
+                    </a:lnB>
+                    <a:lnTlToBr w="12700" cmpd="sng">
+                      <a:noFill/>
+                      <a:prstDash val="solid"/>
+                    </a:lnTlToBr>
+                    <a:lnBlToTr w="12700" cmpd="sng">
+                      <a:noFill/>
+                      <a:prstDash val="solid"/>
+                    </a:lnBlToTr>
+                  </a:tcPr>
+                </a:tc>
+                <a:extLst>
+                  <a:ext uri="{0D108BD9-81ED-4DB2-BD59-A6C34878D82A}">
+                    <a16:rowId xmlns:a16="http://schemas.microsoft.com/office/drawing/2014/main" val="3080414666"/>
+                  </a:ext>
+                </a:extLst>
+              </a:tr>
+            </a:tbl>
+          </a:graphicData>
+        </a:graphic>
+      </p:graphicFrame>
+      <p:sp>
+        <p:nvSpPr>
+          <p:cNvPr id="9" name="TextBox 8">
+            <a:extLst>
+              <a:ext uri="{FF2B5EF4-FFF2-40B4-BE49-F238E27FC236}">
+                <a16:creationId xmlns:a16="http://schemas.microsoft.com/office/drawing/2014/main" id="{3C2F2F7C-508A-B5FE-C429-56374C2E0B30}"/>
+              </a:ext>
+            </a:extLst>
+          </p:cNvPr>
+          <p:cNvSpPr txBox="1"/>
+          <p:nvPr/>
+        </p:nvSpPr>
+        <p:spPr>
+          <a:xfrm>
+            <a:off x="1589926" y="5569545"/>
+            <a:ext cx="6097712" cy="369332"/>
+          </a:xfrm>
+          <a:prstGeom prst="rect">
+            <a:avLst/>
+          </a:prstGeom>
+          <a:noFill/>
+        </p:spPr>
+        <p:txBody>
+          <a:bodyPr wrap="square">
+            <a:spAutoFit/>
+          </a:bodyPr>
+          <a:lstStyle/>
+          <a:p>
+            <a:pPr marL="0" algn="l" rtl="0" eaLnBrk="1" fontAlgn="b" latinLnBrk="0" hangingPunct="1">
+              <a:spcBef>
+                <a:spcPts val="0"/>
+              </a:spcBef>
+              <a:spcAft>
+                <a:spcPts val="0"/>
+              </a:spcAft>
+            </a:pPr>
+            <a:r>
+              <a:rPr lang="en-US" sz="1800" b="0" i="0" u="none" strike="noStrike" kern="1200" dirty="0">
+                <a:solidFill>
+                  <a:srgbClr val="000000"/>
+                </a:solidFill>
+                <a:effectLst/>
+                <a:latin typeface="Calibri" panose="020F0502020204030204" pitchFamily="34" charset="0"/>
+              </a:rPr>
+              <a:t> </a:t>
+            </a:r>
+            <a:endParaRPr lang="en-US" sz="1800" b="0" i="0" u="none" strike="noStrike" dirty="0">
+              <a:effectLst/>
+              <a:latin typeface="Arial" panose="020B0604020202020204" pitchFamily="34" charset="0"/>
+            </a:endParaRPr>
+          </a:p>
+        </p:txBody>
+      </p:sp>
+    </p:spTree>
+    <p:extLst>
+      <p:ext uri="{BB962C8B-B14F-4D97-AF65-F5344CB8AC3E}">
+        <p14:creationId xmlns:p14="http://schemas.microsoft.com/office/powerpoint/2010/main" val="2881732302"/>
+      </p:ext>
+    </p:extLst>
+  </p:cSld>
+  <p:clrMapOvr>
+    <a:masterClrMapping/>
+  </p:clrMapOvr>
+</p:sld>
+</file>
+
+<file path=ppt/slides/slide5.xml><?xml version="1.0" encoding="utf-8"?>
 <p:sld xmlns:a="http://schemas.openxmlformats.org/drawingml/2006/main" xmlns:r="http://schemas.openxmlformats.org/officeDocument/2006/relationships" xmlns:p="http://schemas.openxmlformats.org/presentationml/2006/main">
   <p:cSld>
     <p:spTree>
@@ -10165,7 +14219,7 @@
 </p:sld>
 </file>
 
-<file path=ppt/slides/slide5.xml><?xml version="1.0" encoding="utf-8"?>
+<file path=ppt/slides/slide6.xml><?xml version="1.0" encoding="utf-8"?>
 <p:sld xmlns:a="http://schemas.openxmlformats.org/drawingml/2006/main" xmlns:r="http://schemas.openxmlformats.org/officeDocument/2006/relationships" xmlns:p="http://schemas.openxmlformats.org/presentationml/2006/main">
   <p:cSld>
     <p:spTree>
@@ -10316,7 +14370,7 @@
 </p:sld>
 </file>
 
-<file path=ppt/slides/slide6.xml><?xml version="1.0" encoding="utf-8"?>
+<file path=ppt/slides/slide7.xml><?xml version="1.0" encoding="utf-8"?>
 <p:sld xmlns:a="http://schemas.openxmlformats.org/drawingml/2006/main" xmlns:r="http://schemas.openxmlformats.org/officeDocument/2006/relationships" xmlns:p="http://schemas.openxmlformats.org/presentationml/2006/main">
   <p:cSld>
     <p:spTree>
@@ -10467,7 +14521,7 @@
 </p:sld>
 </file>
 
-<file path=ppt/slides/slide7.xml><?xml version="1.0" encoding="utf-8"?>
+<file path=ppt/slides/slide8.xml><?xml version="1.0" encoding="utf-8"?>
 <p:sld xmlns:a="http://schemas.openxmlformats.org/drawingml/2006/main" xmlns:r="http://schemas.openxmlformats.org/officeDocument/2006/relationships" xmlns:p="http://schemas.openxmlformats.org/presentationml/2006/main">
   <p:cSld>
     <p:spTree>
@@ -10618,7 +14672,7 @@
 </p:sld>
 </file>
 
-<file path=ppt/slides/slide8.xml><?xml version="1.0" encoding="utf-8"?>
+<file path=ppt/slides/slide9.xml><?xml version="1.0" encoding="utf-8"?>
 <p:sld xmlns:a="http://schemas.openxmlformats.org/drawingml/2006/main" xmlns:r="http://schemas.openxmlformats.org/officeDocument/2006/relationships" xmlns:p="http://schemas.openxmlformats.org/presentationml/2006/main">
   <p:cSld>
     <p:spTree>
@@ -10733,194 +14787,6 @@
     <p:extLst>
       <p:ext uri="{BB962C8B-B14F-4D97-AF65-F5344CB8AC3E}">
         <p14:creationId xmlns:p14="http://schemas.microsoft.com/office/powerpoint/2010/main" val="3369901682"/>
-      </p:ext>
-    </p:extLst>
-  </p:cSld>
-  <p:clrMapOvr>
-    <a:masterClrMapping/>
-  </p:clrMapOvr>
-</p:sld>
-</file>
-
-<file path=ppt/slides/slide9.xml><?xml version="1.0" encoding="utf-8"?>
-<p:sld xmlns:a="http://schemas.openxmlformats.org/drawingml/2006/main" xmlns:r="http://schemas.openxmlformats.org/officeDocument/2006/relationships" xmlns:p="http://schemas.openxmlformats.org/presentationml/2006/main">
-  <p:cSld>
-    <p:spTree>
-      <p:nvGrpSpPr>
-        <p:cNvPr id="1" name=""/>
-        <p:cNvGrpSpPr/>
-        <p:nvPr/>
-      </p:nvGrpSpPr>
-      <p:grpSpPr>
-        <a:xfrm>
-          <a:off x="0" y="0"/>
-          <a:ext cx="0" cy="0"/>
-          <a:chOff x="0" y="0"/>
-          <a:chExt cx="0" cy="0"/>
-        </a:xfrm>
-      </p:grpSpPr>
-      <p:sp>
-        <p:nvSpPr>
-          <p:cNvPr id="4" name="Title 3">
-            <a:extLst>
-              <a:ext uri="{FF2B5EF4-FFF2-40B4-BE49-F238E27FC236}">
-                <a16:creationId xmlns:a16="http://schemas.microsoft.com/office/drawing/2014/main" id="{34BAE915-F5C6-7F3E-070D-5F8F00CBDF3B}"/>
-              </a:ext>
-            </a:extLst>
-          </p:cNvPr>
-          <p:cNvSpPr>
-            <a:spLocks noGrp="1"/>
-          </p:cNvSpPr>
-          <p:nvPr>
-            <p:ph type="title"/>
-          </p:nvPr>
-        </p:nvSpPr>
-        <p:spPr>
-          <a:xfrm>
-            <a:off x="274320" y="0"/>
-            <a:ext cx="10515600" cy="1325563"/>
-          </a:xfrm>
-        </p:spPr>
-        <p:txBody>
-          <a:bodyPr/>
-          <a:lstStyle/>
-          <a:p>
-            <a:r>
-              <a:rPr lang="en-US" dirty="0"/>
-              <a:t>Brief overview of inference pipeline</a:t>
-            </a:r>
-          </a:p>
-        </p:txBody>
-      </p:sp>
-      <p:sp>
-        <p:nvSpPr>
-          <p:cNvPr id="5" name="Content Placeholder 4">
-            <a:extLst>
-              <a:ext uri="{FF2B5EF4-FFF2-40B4-BE49-F238E27FC236}">
-                <a16:creationId xmlns:a16="http://schemas.microsoft.com/office/drawing/2014/main" id="{7B181E1F-6D54-55B9-3856-A2F4973E0985}"/>
-              </a:ext>
-            </a:extLst>
-          </p:cNvPr>
-          <p:cNvSpPr>
-            <a:spLocks noGrp="1"/>
-          </p:cNvSpPr>
-          <p:nvPr>
-            <p:ph idx="1"/>
-          </p:nvPr>
-        </p:nvSpPr>
-        <p:spPr>
-          <a:xfrm>
-            <a:off x="283845" y="1097280"/>
-            <a:ext cx="11624310" cy="5646419"/>
-          </a:xfrm>
-        </p:spPr>
-        <p:txBody>
-          <a:bodyPr>
-            <a:normAutofit/>
-          </a:bodyPr>
-          <a:lstStyle/>
-          <a:p>
-            <a:pPr marL="514350" indent="-514350">
-              <a:buFont typeface="+mj-lt"/>
-              <a:buAutoNum type="arabicPeriod"/>
-            </a:pPr>
-            <a:r>
-              <a:rPr lang="en-US" dirty="0"/>
-              <a:t>Use MCMC to infer the number of episomes per observed cluster in both non-dividing and dividing cells</a:t>
-            </a:r>
-          </a:p>
-          <a:p>
-            <a:pPr marL="971550" lvl="1" indent="-514350">
-              <a:buFont typeface="+mj-lt"/>
-              <a:buAutoNum type="alphaLcParenR"/>
-            </a:pPr>
-            <a:r>
-              <a:rPr lang="en-US" dirty="0"/>
-              <a:t>100,000 iterations</a:t>
-            </a:r>
-          </a:p>
-          <a:p>
-            <a:pPr marL="971550" lvl="1" indent="-514350">
-              <a:buFont typeface="+mj-lt"/>
-              <a:buAutoNum type="alphaLcParenR"/>
-            </a:pPr>
-            <a:r>
-              <a:rPr lang="en-US" dirty="0"/>
-              <a:t>5000 burn-in iterations</a:t>
-            </a:r>
-          </a:p>
-          <a:p>
-            <a:pPr marL="971550" lvl="1" indent="-514350">
-              <a:buFont typeface="+mj-lt"/>
-              <a:buAutoNum type="alphaLcParenR"/>
-            </a:pPr>
-            <a:r>
-              <a:rPr lang="en-US" dirty="0"/>
-              <a:t>Run two chains with different initial conditions to check convergence via </a:t>
-            </a:r>
-            <a:r>
-              <a:rPr lang="en-US" dirty="0" err="1"/>
-              <a:t>Rhat</a:t>
-            </a:r>
-            <a:r>
-              <a:rPr lang="en-US" dirty="0"/>
-              <a:t> and effective sample size</a:t>
-            </a:r>
-          </a:p>
-          <a:p>
-            <a:pPr marL="514350" indent="-514350">
-              <a:buFont typeface="+mj-lt"/>
-              <a:buAutoNum type="arabicPeriod"/>
-            </a:pPr>
-            <a:r>
-              <a:rPr lang="en-US" dirty="0"/>
-              <a:t>Add the samples of episomes per clusters within each cell at each iteration to construct a posterior distribution for the number of episomes per cell</a:t>
-            </a:r>
-          </a:p>
-          <a:p>
-            <a:pPr marL="514350" indent="-514350">
-              <a:buFont typeface="+mj-lt"/>
-              <a:buAutoNum type="arabicPeriod"/>
-            </a:pPr>
-            <a:r>
-              <a:rPr lang="en-US" dirty="0"/>
-              <a:t>Fit a </a:t>
-            </a:r>
-            <a:r>
-              <a:rPr lang="en-US" dirty="0" err="1"/>
-              <a:t>poisson</a:t>
-            </a:r>
-            <a:r>
-              <a:rPr lang="en-US" dirty="0"/>
-              <a:t> distribution to the number of episomes in non-dividing cells to get a probability distribution for X0</a:t>
-            </a:r>
-          </a:p>
-          <a:p>
-            <a:pPr marL="514350" indent="-514350">
-              <a:buFont typeface="+mj-lt"/>
-              <a:buAutoNum type="arabicPeriod"/>
-            </a:pPr>
-            <a:r>
-              <a:rPr lang="en-US" dirty="0"/>
-              <a:t>Run grid search for MLE of replication and segregation efficiency using likelihood function marginalized over X0</a:t>
-            </a:r>
-          </a:p>
-          <a:p>
-            <a:pPr marL="514350" indent="-514350">
-              <a:buFont typeface="+mj-lt"/>
-              <a:buAutoNum type="arabicPeriod"/>
-            </a:pPr>
-            <a:r>
-              <a:rPr lang="en-US" dirty="0"/>
-              <a:t>Find region of parameter values that make up 95% confidence region</a:t>
-            </a:r>
-          </a:p>
-        </p:txBody>
-      </p:sp>
-    </p:spTree>
-    <p:extLst>
-      <p:ext uri="{BB962C8B-B14F-4D97-AF65-F5344CB8AC3E}">
-        <p14:creationId xmlns:p14="http://schemas.microsoft.com/office/powerpoint/2010/main" val="1287202952"/>
       </p:ext>
     </p:extLst>
   </p:cSld>

</xml_diff>